<commit_message>
neue erkenntnisse bei cpu lastigen tasks. neue tests mit cpu lastigen tests
</commit_message>
<xml_diff>
--- a/Tests_Unlimited_RAM/Präsentation_testergebnisse.pptx
+++ b/Tests_Unlimited_RAM/Präsentation_testergebnisse.pptx
@@ -7,7 +7,7 @@
     <p:sldMasterId id="2147483660" r:id="rId6"/>
   </p:sldMasterIdLst>
   <p:notesMasterIdLst>
-    <p:notesMasterId r:id="rId26"/>
+    <p:notesMasterId r:id="rId31"/>
   </p:notesMasterIdLst>
   <p:sldIdLst>
     <p:sldId id="269" r:id="rId7"/>
@@ -29,6 +29,11 @@
     <p:sldId id="297" r:id="rId23"/>
     <p:sldId id="298" r:id="rId24"/>
     <p:sldId id="299" r:id="rId25"/>
+    <p:sldId id="300" r:id="rId26"/>
+    <p:sldId id="301" r:id="rId27"/>
+    <p:sldId id="302" r:id="rId28"/>
+    <p:sldId id="303" r:id="rId29"/>
+    <p:sldId id="304" r:id="rId30"/>
   </p:sldIdLst>
   <p:sldSz cx="12192000" cy="6858000"/>
   <p:notesSz cx="6858000" cy="9144000"/>
@@ -19668,8 +19673,8 @@
           </a:p>
         </p:txBody>
       </p:sp>
-      <mc:AlternateContent xmlns:mc="http://schemas.openxmlformats.org/markup-compatibility/2006">
-        <mc:Choice xmlns:p14="http://schemas.microsoft.com/office/powerpoint/2010/main" Requires="p14">
+      <mc:AlternateContent xmlns:mc="http://schemas.openxmlformats.org/markup-compatibility/2006" xmlns:p14="http://schemas.microsoft.com/office/powerpoint/2010/main">
+        <mc:Choice Requires="p14">
           <p:contentPart p14:bwMode="auto" r:id="rId3">
             <p14:nvContentPartPr>
               <p14:cNvPr id="16" name="Freihand 15">
@@ -19688,7 +19693,7 @@
             </p14:xfrm>
           </p:contentPart>
         </mc:Choice>
-        <mc:Fallback>
+        <mc:Fallback xmlns="">
           <p:pic>
             <p:nvPicPr>
               <p:cNvPr id="16" name="Freihand 15">
@@ -21140,6 +21145,2928 @@
     <p:extLst>
       <p:ext uri="{BB962C8B-B14F-4D97-AF65-F5344CB8AC3E}">
         <p14:creationId xmlns:p14="http://schemas.microsoft.com/office/powerpoint/2010/main" val="2340069336"/>
+      </p:ext>
+    </p:extLst>
+  </p:cSld>
+  <p:clrMapOvr>
+    <a:masterClrMapping/>
+  </p:clrMapOvr>
+  <mc:AlternateContent xmlns:mc="http://schemas.openxmlformats.org/markup-compatibility/2006" xmlns:p14="http://schemas.microsoft.com/office/powerpoint/2010/main">
+    <mc:Choice Requires="p14">
+      <p:transition spd="med" p14:dur="700">
+        <p:fade/>
+      </p:transition>
+    </mc:Choice>
+    <mc:Fallback xmlns="">
+      <p:transition spd="med">
+        <p:fade/>
+      </p:transition>
+    </mc:Fallback>
+  </mc:AlternateContent>
+</p:sld>
+</file>
+
+<file path=ppt/slides/slide20.xml><?xml version="1.0" encoding="utf-8"?>
+<p:sld xmlns:a="http://schemas.openxmlformats.org/drawingml/2006/main" xmlns:r="http://schemas.openxmlformats.org/officeDocument/2006/relationships" xmlns:p="http://schemas.openxmlformats.org/presentationml/2006/main">
+  <p:cSld>
+    <p:spTree>
+      <p:nvGrpSpPr>
+        <p:cNvPr id="1" name=""/>
+        <p:cNvGrpSpPr/>
+        <p:nvPr/>
+      </p:nvGrpSpPr>
+      <p:grpSpPr>
+        <a:xfrm>
+          <a:off x="0" y="0"/>
+          <a:ext cx="0" cy="0"/>
+          <a:chOff x="0" y="0"/>
+          <a:chExt cx="0" cy="0"/>
+        </a:xfrm>
+      </p:grpSpPr>
+      <p:sp>
+        <p:nvSpPr>
+          <p:cNvPr id="2" name="Titel 1">
+            <a:extLst>
+              <a:ext uri="{FF2B5EF4-FFF2-40B4-BE49-F238E27FC236}">
+                <a16:creationId xmlns:a16="http://schemas.microsoft.com/office/drawing/2014/main" id="{B22D74DF-2D49-1A74-620A-523203A43A2F}"/>
+              </a:ext>
+            </a:extLst>
+          </p:cNvPr>
+          <p:cNvSpPr>
+            <a:spLocks noGrp="1"/>
+          </p:cNvSpPr>
+          <p:nvPr>
+            <p:ph type="title"/>
+          </p:nvPr>
+        </p:nvSpPr>
+        <p:spPr/>
+        <p:txBody>
+          <a:bodyPr/>
+          <a:lstStyle/>
+          <a:p>
+            <a:r>
+              <a:rPr lang="de-DE" dirty="0"/>
+              <a:t>Änderungen</a:t>
+            </a:r>
+          </a:p>
+        </p:txBody>
+      </p:sp>
+      <p:sp>
+        <p:nvSpPr>
+          <p:cNvPr id="8" name="Textplatzhalter 3">
+            <a:extLst>
+              <a:ext uri="{FF2B5EF4-FFF2-40B4-BE49-F238E27FC236}">
+                <a16:creationId xmlns:a16="http://schemas.microsoft.com/office/drawing/2014/main" id="{7308C11C-ACE4-C96A-BC26-915DF956C5C8}"/>
+              </a:ext>
+            </a:extLst>
+          </p:cNvPr>
+          <p:cNvSpPr>
+            <a:spLocks noGrp="1"/>
+          </p:cNvSpPr>
+          <p:nvPr/>
+        </p:nvSpPr>
+        <p:spPr bwMode="auto">
+          <a:xfrm>
+            <a:off x="374723" y="849131"/>
+            <a:ext cx="8820993" cy="504540"/>
+          </a:xfrm>
+          <a:prstGeom prst="rect">
+            <a:avLst/>
+          </a:prstGeom>
+          <a:noFill/>
+          <a:ln>
+            <a:noFill/>
+          </a:ln>
+          <a:extLst>
+            <a:ext uri="{909E8E84-426E-40DD-AFC4-6F175D3DCCD1}">
+              <a14:hiddenFill xmlns:a14="http://schemas.microsoft.com/office/drawing/2010/main">
+                <a:solidFill>
+                  <a:srgbClr val="FFFFFF"/>
+                </a:solidFill>
+              </a14:hiddenFill>
+            </a:ext>
+            <a:ext uri="{91240B29-F687-4F45-9708-019B960494DF}">
+              <a14:hiddenLine xmlns:a14="http://schemas.microsoft.com/office/drawing/2010/main" w="9525">
+                <a:solidFill>
+                  <a:srgbClr val="000000"/>
+                </a:solidFill>
+                <a:miter lim="800000"/>
+                <a:headEnd/>
+                <a:tailEnd/>
+              </a14:hiddenLine>
+            </a:ext>
+          </a:extLst>
+        </p:spPr>
+        <p:txBody>
+          <a:bodyPr vert="horz" wrap="square" lIns="0" tIns="0" rIns="0" bIns="0" numCol="1" anchor="t" anchorCtr="0" compatLnSpc="1">
+            <a:prstTxWarp prst="textNoShape">
+              <a:avLst/>
+            </a:prstTxWarp>
+          </a:bodyPr>
+          <a:lstStyle>
+            <a:lvl1pPr marL="0" indent="0" algn="l" rtl="0" fontAlgn="base">
+              <a:lnSpc>
+                <a:spcPct val="110000"/>
+              </a:lnSpc>
+              <a:spcBef>
+                <a:spcPct val="0"/>
+              </a:spcBef>
+              <a:spcAft>
+                <a:spcPct val="0"/>
+              </a:spcAft>
+              <a:buFont typeface="Arial" panose="020B0604020202020204" pitchFamily="34" charset="0"/>
+              <a:buNone/>
+              <a:defRPr sz="2800" kern="1200">
+                <a:solidFill>
+                  <a:schemeClr val="tx2"/>
+                </a:solidFill>
+                <a:latin typeface="+mn-lt"/>
+                <a:ea typeface="+mn-ea"/>
+                <a:cs typeface="+mn-cs"/>
+              </a:defRPr>
+            </a:lvl1pPr>
+            <a:lvl2pPr marL="984250" indent="-355600" algn="l" rtl="0" fontAlgn="base">
+              <a:lnSpc>
+                <a:spcPct val="110000"/>
+              </a:lnSpc>
+              <a:spcBef>
+                <a:spcPct val="0"/>
+              </a:spcBef>
+              <a:spcAft>
+                <a:spcPct val="0"/>
+              </a:spcAft>
+              <a:buFont typeface="Arial" panose="020B0604020202020204" pitchFamily="34" charset="0"/>
+              <a:buChar char="–"/>
+              <a:defRPr sz="1900" kern="1200">
+                <a:solidFill>
+                  <a:schemeClr val="tx1"/>
+                </a:solidFill>
+                <a:latin typeface="+mn-lt"/>
+                <a:ea typeface="+mn-ea"/>
+                <a:cs typeface="+mn-cs"/>
+              </a:defRPr>
+            </a:lvl2pPr>
+            <a:lvl3pPr marL="1346200" indent="-361950" algn="l" rtl="0" fontAlgn="base">
+              <a:lnSpc>
+                <a:spcPct val="110000"/>
+              </a:lnSpc>
+              <a:spcBef>
+                <a:spcPct val="0"/>
+              </a:spcBef>
+              <a:spcAft>
+                <a:spcPct val="0"/>
+              </a:spcAft>
+              <a:buFont typeface="Arial" panose="020B0604020202020204" pitchFamily="34" charset="0"/>
+              <a:buChar char="–"/>
+              <a:defRPr sz="1900" kern="1200">
+                <a:solidFill>
+                  <a:schemeClr val="tx1"/>
+                </a:solidFill>
+                <a:latin typeface="+mn-lt"/>
+                <a:ea typeface="+mn-ea"/>
+                <a:cs typeface="+mn-cs"/>
+              </a:defRPr>
+            </a:lvl3pPr>
+            <a:lvl4pPr marL="1701800" indent="-355600" algn="l" rtl="0" fontAlgn="base">
+              <a:lnSpc>
+                <a:spcPct val="110000"/>
+              </a:lnSpc>
+              <a:spcBef>
+                <a:spcPct val="0"/>
+              </a:spcBef>
+              <a:spcAft>
+                <a:spcPct val="0"/>
+              </a:spcAft>
+              <a:buFont typeface="Arial" panose="020B0604020202020204" pitchFamily="34" charset="0"/>
+              <a:buChar char="–"/>
+              <a:defRPr sz="1900" kern="1200">
+                <a:solidFill>
+                  <a:schemeClr val="tx1"/>
+                </a:solidFill>
+                <a:latin typeface="+mn-lt"/>
+                <a:ea typeface="+mn-ea"/>
+                <a:cs typeface="+mn-cs"/>
+              </a:defRPr>
+            </a:lvl4pPr>
+            <a:lvl5pPr marL="2063750" indent="-361950" algn="l" rtl="0" fontAlgn="base">
+              <a:lnSpc>
+                <a:spcPct val="110000"/>
+              </a:lnSpc>
+              <a:spcBef>
+                <a:spcPct val="0"/>
+              </a:spcBef>
+              <a:spcAft>
+                <a:spcPct val="0"/>
+              </a:spcAft>
+              <a:buFont typeface="Arial" panose="020B0604020202020204" pitchFamily="34" charset="0"/>
+              <a:buChar char="–"/>
+              <a:defRPr sz="1900" kern="1200">
+                <a:solidFill>
+                  <a:schemeClr val="tx1"/>
+                </a:solidFill>
+                <a:latin typeface="+mn-lt"/>
+                <a:ea typeface="+mn-ea"/>
+                <a:cs typeface="+mn-cs"/>
+              </a:defRPr>
+            </a:lvl5pPr>
+            <a:lvl6pPr marL="2514600" indent="-228600" algn="l" defTabSz="914400" rtl="0" eaLnBrk="1" latinLnBrk="0" hangingPunct="1">
+              <a:lnSpc>
+                <a:spcPct val="90000"/>
+              </a:lnSpc>
+              <a:spcBef>
+                <a:spcPts val="500"/>
+              </a:spcBef>
+              <a:buFont typeface="Arial" panose="020B0604020202020204" pitchFamily="34" charset="0"/>
+              <a:buChar char="•"/>
+              <a:defRPr sz="1800" kern="1200">
+                <a:solidFill>
+                  <a:schemeClr val="tx1"/>
+                </a:solidFill>
+                <a:latin typeface="+mn-lt"/>
+                <a:ea typeface="+mn-ea"/>
+                <a:cs typeface="+mn-cs"/>
+              </a:defRPr>
+            </a:lvl6pPr>
+            <a:lvl7pPr marL="2971800" indent="-228600" algn="l" defTabSz="914400" rtl="0" eaLnBrk="1" latinLnBrk="0" hangingPunct="1">
+              <a:lnSpc>
+                <a:spcPct val="90000"/>
+              </a:lnSpc>
+              <a:spcBef>
+                <a:spcPts val="500"/>
+              </a:spcBef>
+              <a:buFont typeface="Arial" panose="020B0604020202020204" pitchFamily="34" charset="0"/>
+              <a:buChar char="•"/>
+              <a:defRPr sz="1800" kern="1200">
+                <a:solidFill>
+                  <a:schemeClr val="tx1"/>
+                </a:solidFill>
+                <a:latin typeface="+mn-lt"/>
+                <a:ea typeface="+mn-ea"/>
+                <a:cs typeface="+mn-cs"/>
+              </a:defRPr>
+            </a:lvl7pPr>
+            <a:lvl8pPr marL="3429000" indent="-228600" algn="l" defTabSz="914400" rtl="0" eaLnBrk="1" latinLnBrk="0" hangingPunct="1">
+              <a:lnSpc>
+                <a:spcPct val="90000"/>
+              </a:lnSpc>
+              <a:spcBef>
+                <a:spcPts val="500"/>
+              </a:spcBef>
+              <a:buFont typeface="Arial" panose="020B0604020202020204" pitchFamily="34" charset="0"/>
+              <a:buChar char="•"/>
+              <a:defRPr sz="1800" kern="1200">
+                <a:solidFill>
+                  <a:schemeClr val="tx1"/>
+                </a:solidFill>
+                <a:latin typeface="+mn-lt"/>
+                <a:ea typeface="+mn-ea"/>
+                <a:cs typeface="+mn-cs"/>
+              </a:defRPr>
+            </a:lvl8pPr>
+            <a:lvl9pPr marL="3886200" indent="-228600" algn="l" defTabSz="914400" rtl="0" eaLnBrk="1" latinLnBrk="0" hangingPunct="1">
+              <a:lnSpc>
+                <a:spcPct val="90000"/>
+              </a:lnSpc>
+              <a:spcBef>
+                <a:spcPts val="500"/>
+              </a:spcBef>
+              <a:buFont typeface="Arial" panose="020B0604020202020204" pitchFamily="34" charset="0"/>
+              <a:buChar char="•"/>
+              <a:defRPr sz="1800" kern="1200">
+                <a:solidFill>
+                  <a:schemeClr val="tx1"/>
+                </a:solidFill>
+                <a:latin typeface="+mn-lt"/>
+                <a:ea typeface="+mn-ea"/>
+                <a:cs typeface="+mn-cs"/>
+              </a:defRPr>
+            </a:lvl9pPr>
+          </a:lstStyle>
+          <a:p>
+            <a:r>
+              <a:rPr lang="de-DE" dirty="0">
+                <a:cs typeface="Arial"/>
+              </a:rPr>
+              <a:t>Idee</a:t>
+            </a:r>
+            <a:endParaRPr lang="de-DE" dirty="0"/>
+          </a:p>
+        </p:txBody>
+      </p:sp>
+      <p:sp>
+        <p:nvSpPr>
+          <p:cNvPr id="6" name="Inhaltsplatzhalter 2">
+            <a:extLst>
+              <a:ext uri="{FF2B5EF4-FFF2-40B4-BE49-F238E27FC236}">
+                <a16:creationId xmlns:a16="http://schemas.microsoft.com/office/drawing/2014/main" id="{472B3CFD-6066-EDF8-D8C0-4299D259EC7C}"/>
+              </a:ext>
+            </a:extLst>
+          </p:cNvPr>
+          <p:cNvSpPr txBox="1">
+            <a:spLocks/>
+          </p:cNvSpPr>
+          <p:nvPr/>
+        </p:nvSpPr>
+        <p:spPr>
+          <a:xfrm>
+            <a:off x="371475" y="1604682"/>
+            <a:ext cx="11553825" cy="4200582"/>
+          </a:xfrm>
+          <a:prstGeom prst="rect">
+            <a:avLst/>
+          </a:prstGeom>
+        </p:spPr>
+        <p:txBody>
+          <a:bodyPr vert="horz" lIns="0" tIns="0" rIns="0" bIns="0" rtlCol="0" anchor="t" anchorCtr="0">
+            <a:noAutofit/>
+          </a:bodyPr>
+          <a:lstStyle>
+            <a:lvl1pPr marL="355600" indent="-355600" algn="l" defTabSz="914400" rtl="0" eaLnBrk="1" latinLnBrk="0" hangingPunct="1">
+              <a:lnSpc>
+                <a:spcPct val="110000"/>
+              </a:lnSpc>
+              <a:spcBef>
+                <a:spcPts val="0"/>
+              </a:spcBef>
+              <a:buClr>
+                <a:srgbClr val="0014A0"/>
+              </a:buClr>
+              <a:buFont typeface="Arial" panose="020B0604020202020204" pitchFamily="34" charset="0"/>
+              <a:buChar char="•"/>
+              <a:defRPr sz="1900" kern="1200">
+                <a:solidFill>
+                  <a:schemeClr val="tx1"/>
+                </a:solidFill>
+                <a:latin typeface="+mn-lt"/>
+                <a:ea typeface="+mn-ea"/>
+                <a:cs typeface="+mn-cs"/>
+              </a:defRPr>
+            </a:lvl1pPr>
+            <a:lvl2pPr marL="984250" indent="-355600" algn="l" defTabSz="914400" rtl="0" eaLnBrk="1" latinLnBrk="0" hangingPunct="1">
+              <a:lnSpc>
+                <a:spcPct val="110000"/>
+              </a:lnSpc>
+              <a:spcBef>
+                <a:spcPts val="0"/>
+              </a:spcBef>
+              <a:buFont typeface="Arial" panose="020B0604020202020204" pitchFamily="34" charset="0"/>
+              <a:buChar char="–"/>
+              <a:defRPr sz="1900" kern="1200">
+                <a:solidFill>
+                  <a:schemeClr val="tx1"/>
+                </a:solidFill>
+                <a:latin typeface="+mn-lt"/>
+                <a:ea typeface="+mn-ea"/>
+                <a:cs typeface="+mn-cs"/>
+              </a:defRPr>
+            </a:lvl2pPr>
+            <a:lvl3pPr marL="1346200" indent="-361950" algn="l" defTabSz="914400" rtl="0" eaLnBrk="1" latinLnBrk="0" hangingPunct="1">
+              <a:lnSpc>
+                <a:spcPct val="110000"/>
+              </a:lnSpc>
+              <a:spcBef>
+                <a:spcPts val="0"/>
+              </a:spcBef>
+              <a:buFont typeface="Arial" panose="020B0604020202020204" pitchFamily="34" charset="0"/>
+              <a:buChar char="–"/>
+              <a:defRPr sz="1900" kern="1200">
+                <a:solidFill>
+                  <a:schemeClr val="tx1"/>
+                </a:solidFill>
+                <a:latin typeface="+mn-lt"/>
+                <a:ea typeface="+mn-ea"/>
+                <a:cs typeface="+mn-cs"/>
+              </a:defRPr>
+            </a:lvl3pPr>
+            <a:lvl4pPr marL="1701800" indent="-355600" algn="l" defTabSz="914400" rtl="0" eaLnBrk="1" latinLnBrk="0" hangingPunct="1">
+              <a:lnSpc>
+                <a:spcPct val="110000"/>
+              </a:lnSpc>
+              <a:spcBef>
+                <a:spcPts val="0"/>
+              </a:spcBef>
+              <a:buFont typeface="Arial" panose="020B0604020202020204" pitchFamily="34" charset="0"/>
+              <a:buChar char="–"/>
+              <a:defRPr sz="1900" kern="1200">
+                <a:solidFill>
+                  <a:schemeClr val="tx1"/>
+                </a:solidFill>
+                <a:latin typeface="+mn-lt"/>
+                <a:ea typeface="+mn-ea"/>
+                <a:cs typeface="+mn-cs"/>
+              </a:defRPr>
+            </a:lvl4pPr>
+            <a:lvl5pPr marL="2063750" indent="-361950" algn="l" defTabSz="914400" rtl="0" eaLnBrk="1" latinLnBrk="0" hangingPunct="1">
+              <a:lnSpc>
+                <a:spcPct val="110000"/>
+              </a:lnSpc>
+              <a:spcBef>
+                <a:spcPts val="0"/>
+              </a:spcBef>
+              <a:buFont typeface="Arial" panose="020B0604020202020204" pitchFamily="34" charset="0"/>
+              <a:buChar char="–"/>
+              <a:defRPr sz="1900" kern="1200">
+                <a:solidFill>
+                  <a:schemeClr val="tx1"/>
+                </a:solidFill>
+                <a:latin typeface="+mn-lt"/>
+                <a:ea typeface="+mn-ea"/>
+                <a:cs typeface="+mn-cs"/>
+              </a:defRPr>
+            </a:lvl5pPr>
+            <a:lvl6pPr marL="2514600" indent="-228600" algn="l" defTabSz="914400" rtl="0" eaLnBrk="1" latinLnBrk="0" hangingPunct="1">
+              <a:lnSpc>
+                <a:spcPct val="90000"/>
+              </a:lnSpc>
+              <a:spcBef>
+                <a:spcPts val="500"/>
+              </a:spcBef>
+              <a:buFont typeface="Arial" panose="020B0604020202020204" pitchFamily="34" charset="0"/>
+              <a:buChar char="•"/>
+              <a:defRPr sz="1800" kern="1200">
+                <a:solidFill>
+                  <a:schemeClr val="tx1"/>
+                </a:solidFill>
+                <a:latin typeface="+mn-lt"/>
+                <a:ea typeface="+mn-ea"/>
+                <a:cs typeface="+mn-cs"/>
+              </a:defRPr>
+            </a:lvl6pPr>
+            <a:lvl7pPr marL="2971800" indent="-228600" algn="l" defTabSz="914400" rtl="0" eaLnBrk="1" latinLnBrk="0" hangingPunct="1">
+              <a:lnSpc>
+                <a:spcPct val="90000"/>
+              </a:lnSpc>
+              <a:spcBef>
+                <a:spcPts val="500"/>
+              </a:spcBef>
+              <a:buFont typeface="Arial" panose="020B0604020202020204" pitchFamily="34" charset="0"/>
+              <a:buChar char="•"/>
+              <a:defRPr sz="1800" kern="1200">
+                <a:solidFill>
+                  <a:schemeClr val="tx1"/>
+                </a:solidFill>
+                <a:latin typeface="+mn-lt"/>
+                <a:ea typeface="+mn-ea"/>
+                <a:cs typeface="+mn-cs"/>
+              </a:defRPr>
+            </a:lvl7pPr>
+            <a:lvl8pPr marL="3429000" indent="-228600" algn="l" defTabSz="914400" rtl="0" eaLnBrk="1" latinLnBrk="0" hangingPunct="1">
+              <a:lnSpc>
+                <a:spcPct val="90000"/>
+              </a:lnSpc>
+              <a:spcBef>
+                <a:spcPts val="500"/>
+              </a:spcBef>
+              <a:buFont typeface="Arial" panose="020B0604020202020204" pitchFamily="34" charset="0"/>
+              <a:buChar char="•"/>
+              <a:defRPr sz="1800" kern="1200">
+                <a:solidFill>
+                  <a:schemeClr val="tx1"/>
+                </a:solidFill>
+                <a:latin typeface="+mn-lt"/>
+                <a:ea typeface="+mn-ea"/>
+                <a:cs typeface="+mn-cs"/>
+              </a:defRPr>
+            </a:lvl8pPr>
+            <a:lvl9pPr marL="3886200" indent="-228600" algn="l" defTabSz="914400" rtl="0" eaLnBrk="1" latinLnBrk="0" hangingPunct="1">
+              <a:lnSpc>
+                <a:spcPct val="90000"/>
+              </a:lnSpc>
+              <a:spcBef>
+                <a:spcPts val="500"/>
+              </a:spcBef>
+              <a:buFont typeface="Arial" panose="020B0604020202020204" pitchFamily="34" charset="0"/>
+              <a:buChar char="•"/>
+              <a:defRPr sz="1800" kern="1200">
+                <a:solidFill>
+                  <a:schemeClr val="tx1"/>
+                </a:solidFill>
+                <a:latin typeface="+mn-lt"/>
+                <a:ea typeface="+mn-ea"/>
+                <a:cs typeface="+mn-cs"/>
+              </a:defRPr>
+            </a:lvl9pPr>
+          </a:lstStyle>
+          <a:p>
+            <a:r>
+              <a:rPr lang="de-DE" dirty="0"/>
+              <a:t>Bei den allermeisten </a:t>
+            </a:r>
+            <a:r>
+              <a:rPr lang="de-DE" dirty="0" err="1"/>
+              <a:t>Backends</a:t>
+            </a:r>
+            <a:r>
+              <a:rPr lang="de-DE" dirty="0"/>
+              <a:t> wird nicht nur gewartet sondern auch gerechnet.</a:t>
+            </a:r>
+          </a:p>
+          <a:p>
+            <a:r>
+              <a:rPr lang="de-DE" dirty="0"/>
+              <a:t>Neu: </a:t>
+            </a:r>
+            <a:r>
+              <a:rPr lang="de-DE" b="1" dirty="0"/>
+              <a:t>1/3 CPU intensive Task, 2/3 Warten</a:t>
+            </a:r>
+            <a:r>
+              <a:rPr lang="de-DE" dirty="0"/>
+              <a:t> (z. B. auf Datenbankergebnisse)</a:t>
+            </a:r>
+          </a:p>
+        </p:txBody>
+      </p:sp>
+      <p:pic>
+        <p:nvPicPr>
+          <p:cNvPr id="9" name="Grafik 8">
+            <a:extLst>
+              <a:ext uri="{FF2B5EF4-FFF2-40B4-BE49-F238E27FC236}">
+                <a16:creationId xmlns:a16="http://schemas.microsoft.com/office/drawing/2014/main" id="{3FC8AEDD-458C-8EDA-8BAC-619D7844B269}"/>
+              </a:ext>
+            </a:extLst>
+          </p:cNvPr>
+          <p:cNvPicPr>
+            <a:picLocks noChangeAspect="1"/>
+          </p:cNvPicPr>
+          <p:nvPr/>
+        </p:nvPicPr>
+        <p:blipFill>
+          <a:blip r:embed="rId2"/>
+          <a:stretch>
+            <a:fillRect/>
+          </a:stretch>
+        </p:blipFill>
+        <p:spPr>
+          <a:xfrm>
+            <a:off x="371475" y="2324222"/>
+            <a:ext cx="2427585" cy="3844196"/>
+          </a:xfrm>
+          <a:prstGeom prst="rect">
+            <a:avLst/>
+          </a:prstGeom>
+          <a:ln>
+            <a:noFill/>
+          </a:ln>
+          <a:effectLst>
+            <a:outerShdw blurRad="292100" dist="139700" dir="2700000" algn="tl" rotWithShape="0">
+              <a:srgbClr val="333333">
+                <a:alpha val="65000"/>
+              </a:srgbClr>
+            </a:outerShdw>
+          </a:effectLst>
+        </p:spPr>
+      </p:pic>
+    </p:spTree>
+    <p:extLst>
+      <p:ext uri="{BB962C8B-B14F-4D97-AF65-F5344CB8AC3E}">
+        <p14:creationId xmlns:p14="http://schemas.microsoft.com/office/powerpoint/2010/main" val="112807350"/>
+      </p:ext>
+    </p:extLst>
+  </p:cSld>
+  <p:clrMapOvr>
+    <a:masterClrMapping/>
+  </p:clrMapOvr>
+  <mc:AlternateContent xmlns:mc="http://schemas.openxmlformats.org/markup-compatibility/2006" xmlns:p14="http://schemas.microsoft.com/office/powerpoint/2010/main">
+    <mc:Choice Requires="p14">
+      <p:transition spd="med" p14:dur="700">
+        <p:fade/>
+      </p:transition>
+    </mc:Choice>
+    <mc:Fallback xmlns="">
+      <p:transition spd="med">
+        <p:fade/>
+      </p:transition>
+    </mc:Fallback>
+  </mc:AlternateContent>
+</p:sld>
+</file>
+
+<file path=ppt/slides/slide21.xml><?xml version="1.0" encoding="utf-8"?>
+<p:sld xmlns:a="http://schemas.openxmlformats.org/drawingml/2006/main" xmlns:r="http://schemas.openxmlformats.org/officeDocument/2006/relationships" xmlns:p="http://schemas.openxmlformats.org/presentationml/2006/main">
+  <p:cSld>
+    <p:spTree>
+      <p:nvGrpSpPr>
+        <p:cNvPr id="1" name=""/>
+        <p:cNvGrpSpPr/>
+        <p:nvPr/>
+      </p:nvGrpSpPr>
+      <p:grpSpPr>
+        <a:xfrm>
+          <a:off x="0" y="0"/>
+          <a:ext cx="0" cy="0"/>
+          <a:chOff x="0" y="0"/>
+          <a:chExt cx="0" cy="0"/>
+        </a:xfrm>
+      </p:grpSpPr>
+      <p:sp>
+        <p:nvSpPr>
+          <p:cNvPr id="2" name="Titel 1">
+            <a:extLst>
+              <a:ext uri="{FF2B5EF4-FFF2-40B4-BE49-F238E27FC236}">
+                <a16:creationId xmlns:a16="http://schemas.microsoft.com/office/drawing/2014/main" id="{B22D74DF-2D49-1A74-620A-523203A43A2F}"/>
+              </a:ext>
+            </a:extLst>
+          </p:cNvPr>
+          <p:cNvSpPr>
+            <a:spLocks noGrp="1"/>
+          </p:cNvSpPr>
+          <p:nvPr>
+            <p:ph type="title"/>
+          </p:nvPr>
+        </p:nvSpPr>
+        <p:spPr/>
+        <p:txBody>
+          <a:bodyPr/>
+          <a:lstStyle/>
+          <a:p>
+            <a:r>
+              <a:rPr lang="de-DE" dirty="0"/>
+              <a:t>Neue Ergebnisse</a:t>
+            </a:r>
+          </a:p>
+        </p:txBody>
+      </p:sp>
+      <p:sp>
+        <p:nvSpPr>
+          <p:cNvPr id="8" name="Textplatzhalter 3">
+            <a:extLst>
+              <a:ext uri="{FF2B5EF4-FFF2-40B4-BE49-F238E27FC236}">
+                <a16:creationId xmlns:a16="http://schemas.microsoft.com/office/drawing/2014/main" id="{7308C11C-ACE4-C96A-BC26-915DF956C5C8}"/>
+              </a:ext>
+            </a:extLst>
+          </p:cNvPr>
+          <p:cNvSpPr>
+            <a:spLocks noGrp="1"/>
+          </p:cNvSpPr>
+          <p:nvPr/>
+        </p:nvSpPr>
+        <p:spPr bwMode="auto">
+          <a:xfrm>
+            <a:off x="374723" y="849131"/>
+            <a:ext cx="8820993" cy="504540"/>
+          </a:xfrm>
+          <a:prstGeom prst="rect">
+            <a:avLst/>
+          </a:prstGeom>
+          <a:noFill/>
+          <a:ln>
+            <a:noFill/>
+          </a:ln>
+          <a:extLst>
+            <a:ext uri="{909E8E84-426E-40DD-AFC4-6F175D3DCCD1}">
+              <a14:hiddenFill xmlns:a14="http://schemas.microsoft.com/office/drawing/2010/main">
+                <a:solidFill>
+                  <a:srgbClr val="FFFFFF"/>
+                </a:solidFill>
+              </a14:hiddenFill>
+            </a:ext>
+            <a:ext uri="{91240B29-F687-4F45-9708-019B960494DF}">
+              <a14:hiddenLine xmlns:a14="http://schemas.microsoft.com/office/drawing/2010/main" w="9525">
+                <a:solidFill>
+                  <a:srgbClr val="000000"/>
+                </a:solidFill>
+                <a:miter lim="800000"/>
+                <a:headEnd/>
+                <a:tailEnd/>
+              </a14:hiddenLine>
+            </a:ext>
+          </a:extLst>
+        </p:spPr>
+        <p:txBody>
+          <a:bodyPr vert="horz" wrap="square" lIns="0" tIns="0" rIns="0" bIns="0" numCol="1" anchor="t" anchorCtr="0" compatLnSpc="1">
+            <a:prstTxWarp prst="textNoShape">
+              <a:avLst/>
+            </a:prstTxWarp>
+          </a:bodyPr>
+          <a:lstStyle>
+            <a:lvl1pPr marL="0" indent="0" algn="l" rtl="0" fontAlgn="base">
+              <a:lnSpc>
+                <a:spcPct val="110000"/>
+              </a:lnSpc>
+              <a:spcBef>
+                <a:spcPct val="0"/>
+              </a:spcBef>
+              <a:spcAft>
+                <a:spcPct val="0"/>
+              </a:spcAft>
+              <a:buFont typeface="Arial" panose="020B0604020202020204" pitchFamily="34" charset="0"/>
+              <a:buNone/>
+              <a:defRPr sz="2800" kern="1200">
+                <a:solidFill>
+                  <a:schemeClr val="tx2"/>
+                </a:solidFill>
+                <a:latin typeface="+mn-lt"/>
+                <a:ea typeface="+mn-ea"/>
+                <a:cs typeface="+mn-cs"/>
+              </a:defRPr>
+            </a:lvl1pPr>
+            <a:lvl2pPr marL="984250" indent="-355600" algn="l" rtl="0" fontAlgn="base">
+              <a:lnSpc>
+                <a:spcPct val="110000"/>
+              </a:lnSpc>
+              <a:spcBef>
+                <a:spcPct val="0"/>
+              </a:spcBef>
+              <a:spcAft>
+                <a:spcPct val="0"/>
+              </a:spcAft>
+              <a:buFont typeface="Arial" panose="020B0604020202020204" pitchFamily="34" charset="0"/>
+              <a:buChar char="–"/>
+              <a:defRPr sz="1900" kern="1200">
+                <a:solidFill>
+                  <a:schemeClr val="tx1"/>
+                </a:solidFill>
+                <a:latin typeface="+mn-lt"/>
+                <a:ea typeface="+mn-ea"/>
+                <a:cs typeface="+mn-cs"/>
+              </a:defRPr>
+            </a:lvl2pPr>
+            <a:lvl3pPr marL="1346200" indent="-361950" algn="l" rtl="0" fontAlgn="base">
+              <a:lnSpc>
+                <a:spcPct val="110000"/>
+              </a:lnSpc>
+              <a:spcBef>
+                <a:spcPct val="0"/>
+              </a:spcBef>
+              <a:spcAft>
+                <a:spcPct val="0"/>
+              </a:spcAft>
+              <a:buFont typeface="Arial" panose="020B0604020202020204" pitchFamily="34" charset="0"/>
+              <a:buChar char="–"/>
+              <a:defRPr sz="1900" kern="1200">
+                <a:solidFill>
+                  <a:schemeClr val="tx1"/>
+                </a:solidFill>
+                <a:latin typeface="+mn-lt"/>
+                <a:ea typeface="+mn-ea"/>
+                <a:cs typeface="+mn-cs"/>
+              </a:defRPr>
+            </a:lvl3pPr>
+            <a:lvl4pPr marL="1701800" indent="-355600" algn="l" rtl="0" fontAlgn="base">
+              <a:lnSpc>
+                <a:spcPct val="110000"/>
+              </a:lnSpc>
+              <a:spcBef>
+                <a:spcPct val="0"/>
+              </a:spcBef>
+              <a:spcAft>
+                <a:spcPct val="0"/>
+              </a:spcAft>
+              <a:buFont typeface="Arial" panose="020B0604020202020204" pitchFamily="34" charset="0"/>
+              <a:buChar char="–"/>
+              <a:defRPr sz="1900" kern="1200">
+                <a:solidFill>
+                  <a:schemeClr val="tx1"/>
+                </a:solidFill>
+                <a:latin typeface="+mn-lt"/>
+                <a:ea typeface="+mn-ea"/>
+                <a:cs typeface="+mn-cs"/>
+              </a:defRPr>
+            </a:lvl4pPr>
+            <a:lvl5pPr marL="2063750" indent="-361950" algn="l" rtl="0" fontAlgn="base">
+              <a:lnSpc>
+                <a:spcPct val="110000"/>
+              </a:lnSpc>
+              <a:spcBef>
+                <a:spcPct val="0"/>
+              </a:spcBef>
+              <a:spcAft>
+                <a:spcPct val="0"/>
+              </a:spcAft>
+              <a:buFont typeface="Arial" panose="020B0604020202020204" pitchFamily="34" charset="0"/>
+              <a:buChar char="–"/>
+              <a:defRPr sz="1900" kern="1200">
+                <a:solidFill>
+                  <a:schemeClr val="tx1"/>
+                </a:solidFill>
+                <a:latin typeface="+mn-lt"/>
+                <a:ea typeface="+mn-ea"/>
+                <a:cs typeface="+mn-cs"/>
+              </a:defRPr>
+            </a:lvl5pPr>
+            <a:lvl6pPr marL="2514600" indent="-228600" algn="l" defTabSz="914400" rtl="0" eaLnBrk="1" latinLnBrk="0" hangingPunct="1">
+              <a:lnSpc>
+                <a:spcPct val="90000"/>
+              </a:lnSpc>
+              <a:spcBef>
+                <a:spcPts val="500"/>
+              </a:spcBef>
+              <a:buFont typeface="Arial" panose="020B0604020202020204" pitchFamily="34" charset="0"/>
+              <a:buChar char="•"/>
+              <a:defRPr sz="1800" kern="1200">
+                <a:solidFill>
+                  <a:schemeClr val="tx1"/>
+                </a:solidFill>
+                <a:latin typeface="+mn-lt"/>
+                <a:ea typeface="+mn-ea"/>
+                <a:cs typeface="+mn-cs"/>
+              </a:defRPr>
+            </a:lvl6pPr>
+            <a:lvl7pPr marL="2971800" indent="-228600" algn="l" defTabSz="914400" rtl="0" eaLnBrk="1" latinLnBrk="0" hangingPunct="1">
+              <a:lnSpc>
+                <a:spcPct val="90000"/>
+              </a:lnSpc>
+              <a:spcBef>
+                <a:spcPts val="500"/>
+              </a:spcBef>
+              <a:buFont typeface="Arial" panose="020B0604020202020204" pitchFamily="34" charset="0"/>
+              <a:buChar char="•"/>
+              <a:defRPr sz="1800" kern="1200">
+                <a:solidFill>
+                  <a:schemeClr val="tx1"/>
+                </a:solidFill>
+                <a:latin typeface="+mn-lt"/>
+                <a:ea typeface="+mn-ea"/>
+                <a:cs typeface="+mn-cs"/>
+              </a:defRPr>
+            </a:lvl7pPr>
+            <a:lvl8pPr marL="3429000" indent="-228600" algn="l" defTabSz="914400" rtl="0" eaLnBrk="1" latinLnBrk="0" hangingPunct="1">
+              <a:lnSpc>
+                <a:spcPct val="90000"/>
+              </a:lnSpc>
+              <a:spcBef>
+                <a:spcPts val="500"/>
+              </a:spcBef>
+              <a:buFont typeface="Arial" panose="020B0604020202020204" pitchFamily="34" charset="0"/>
+              <a:buChar char="•"/>
+              <a:defRPr sz="1800" kern="1200">
+                <a:solidFill>
+                  <a:schemeClr val="tx1"/>
+                </a:solidFill>
+                <a:latin typeface="+mn-lt"/>
+                <a:ea typeface="+mn-ea"/>
+                <a:cs typeface="+mn-cs"/>
+              </a:defRPr>
+            </a:lvl8pPr>
+            <a:lvl9pPr marL="3886200" indent="-228600" algn="l" defTabSz="914400" rtl="0" eaLnBrk="1" latinLnBrk="0" hangingPunct="1">
+              <a:lnSpc>
+                <a:spcPct val="90000"/>
+              </a:lnSpc>
+              <a:spcBef>
+                <a:spcPts val="500"/>
+              </a:spcBef>
+              <a:buFont typeface="Arial" panose="020B0604020202020204" pitchFamily="34" charset="0"/>
+              <a:buChar char="•"/>
+              <a:defRPr sz="1800" kern="1200">
+                <a:solidFill>
+                  <a:schemeClr val="tx1"/>
+                </a:solidFill>
+                <a:latin typeface="+mn-lt"/>
+                <a:ea typeface="+mn-ea"/>
+                <a:cs typeface="+mn-cs"/>
+              </a:defRPr>
+            </a:lvl9pPr>
+          </a:lstStyle>
+          <a:p>
+            <a:r>
+              <a:rPr lang="de-DE" dirty="0">
+                <a:cs typeface="Arial"/>
+              </a:rPr>
+              <a:t>Normal</a:t>
+            </a:r>
+            <a:endParaRPr lang="de-DE" dirty="0"/>
+          </a:p>
+        </p:txBody>
+      </p:sp>
+      <p:pic>
+        <p:nvPicPr>
+          <p:cNvPr id="4" name="Grafik 3" descr="Ein Bild, das Text, Reihe, Screenshot, Diagramm enthält.&#10;&#10;Automatisch generierte Beschreibung">
+            <a:extLst>
+              <a:ext uri="{FF2B5EF4-FFF2-40B4-BE49-F238E27FC236}">
+                <a16:creationId xmlns:a16="http://schemas.microsoft.com/office/drawing/2014/main" id="{4005A155-FF6D-264A-E50B-63B49616326F}"/>
+              </a:ext>
+            </a:extLst>
+          </p:cNvPr>
+          <p:cNvPicPr>
+            <a:picLocks noChangeAspect="1"/>
+          </p:cNvPicPr>
+          <p:nvPr/>
+        </p:nvPicPr>
+        <p:blipFill>
+          <a:blip r:embed="rId2">
+            <a:extLst>
+              <a:ext uri="{28A0092B-C50C-407E-A947-70E740481C1C}">
+                <a14:useLocalDpi xmlns:a14="http://schemas.microsoft.com/office/drawing/2010/main" val="0"/>
+              </a:ext>
+            </a:extLst>
+          </a:blip>
+          <a:stretch>
+            <a:fillRect/>
+          </a:stretch>
+        </p:blipFill>
+        <p:spPr>
+          <a:xfrm>
+            <a:off x="0" y="1604682"/>
+            <a:ext cx="9118121" cy="4592304"/>
+          </a:xfrm>
+          <a:prstGeom prst="rect">
+            <a:avLst/>
+          </a:prstGeom>
+        </p:spPr>
+      </p:pic>
+      <p:sp>
+        <p:nvSpPr>
+          <p:cNvPr id="5" name="Inhaltsplatzhalter 2">
+            <a:extLst>
+              <a:ext uri="{FF2B5EF4-FFF2-40B4-BE49-F238E27FC236}">
+                <a16:creationId xmlns:a16="http://schemas.microsoft.com/office/drawing/2014/main" id="{10983D68-22A8-E9A5-C4F6-235367235DFF}"/>
+              </a:ext>
+            </a:extLst>
+          </p:cNvPr>
+          <p:cNvSpPr txBox="1">
+            <a:spLocks/>
+          </p:cNvSpPr>
+          <p:nvPr/>
+        </p:nvSpPr>
+        <p:spPr>
+          <a:xfrm>
+            <a:off x="8988725" y="1604682"/>
+            <a:ext cx="3095325" cy="4200582"/>
+          </a:xfrm>
+          <a:prstGeom prst="rect">
+            <a:avLst/>
+          </a:prstGeom>
+        </p:spPr>
+        <p:txBody>
+          <a:bodyPr vert="horz" lIns="0" tIns="0" rIns="0" bIns="0" rtlCol="0" anchor="t" anchorCtr="0">
+            <a:noAutofit/>
+          </a:bodyPr>
+          <a:lstStyle>
+            <a:lvl1pPr marL="355600" indent="-355600" algn="l" defTabSz="914400" rtl="0" eaLnBrk="1" latinLnBrk="0" hangingPunct="1">
+              <a:lnSpc>
+                <a:spcPct val="110000"/>
+              </a:lnSpc>
+              <a:spcBef>
+                <a:spcPts val="0"/>
+              </a:spcBef>
+              <a:buClr>
+                <a:srgbClr val="0014A0"/>
+              </a:buClr>
+              <a:buFont typeface="Arial" panose="020B0604020202020204" pitchFamily="34" charset="0"/>
+              <a:buChar char="•"/>
+              <a:defRPr sz="1900" kern="1200">
+                <a:solidFill>
+                  <a:schemeClr val="tx1"/>
+                </a:solidFill>
+                <a:latin typeface="+mn-lt"/>
+                <a:ea typeface="+mn-ea"/>
+                <a:cs typeface="+mn-cs"/>
+              </a:defRPr>
+            </a:lvl1pPr>
+            <a:lvl2pPr marL="984250" indent="-355600" algn="l" defTabSz="914400" rtl="0" eaLnBrk="1" latinLnBrk="0" hangingPunct="1">
+              <a:lnSpc>
+                <a:spcPct val="110000"/>
+              </a:lnSpc>
+              <a:spcBef>
+                <a:spcPts val="0"/>
+              </a:spcBef>
+              <a:buFont typeface="Arial" panose="020B0604020202020204" pitchFamily="34" charset="0"/>
+              <a:buChar char="–"/>
+              <a:defRPr sz="1900" kern="1200">
+                <a:solidFill>
+                  <a:schemeClr val="tx1"/>
+                </a:solidFill>
+                <a:latin typeface="+mn-lt"/>
+                <a:ea typeface="+mn-ea"/>
+                <a:cs typeface="+mn-cs"/>
+              </a:defRPr>
+            </a:lvl2pPr>
+            <a:lvl3pPr marL="1346200" indent="-361950" algn="l" defTabSz="914400" rtl="0" eaLnBrk="1" latinLnBrk="0" hangingPunct="1">
+              <a:lnSpc>
+                <a:spcPct val="110000"/>
+              </a:lnSpc>
+              <a:spcBef>
+                <a:spcPts val="0"/>
+              </a:spcBef>
+              <a:buFont typeface="Arial" panose="020B0604020202020204" pitchFamily="34" charset="0"/>
+              <a:buChar char="–"/>
+              <a:defRPr sz="1900" kern="1200">
+                <a:solidFill>
+                  <a:schemeClr val="tx1"/>
+                </a:solidFill>
+                <a:latin typeface="+mn-lt"/>
+                <a:ea typeface="+mn-ea"/>
+                <a:cs typeface="+mn-cs"/>
+              </a:defRPr>
+            </a:lvl3pPr>
+            <a:lvl4pPr marL="1701800" indent="-355600" algn="l" defTabSz="914400" rtl="0" eaLnBrk="1" latinLnBrk="0" hangingPunct="1">
+              <a:lnSpc>
+                <a:spcPct val="110000"/>
+              </a:lnSpc>
+              <a:spcBef>
+                <a:spcPts val="0"/>
+              </a:spcBef>
+              <a:buFont typeface="Arial" panose="020B0604020202020204" pitchFamily="34" charset="0"/>
+              <a:buChar char="–"/>
+              <a:defRPr sz="1900" kern="1200">
+                <a:solidFill>
+                  <a:schemeClr val="tx1"/>
+                </a:solidFill>
+                <a:latin typeface="+mn-lt"/>
+                <a:ea typeface="+mn-ea"/>
+                <a:cs typeface="+mn-cs"/>
+              </a:defRPr>
+            </a:lvl4pPr>
+            <a:lvl5pPr marL="2063750" indent="-361950" algn="l" defTabSz="914400" rtl="0" eaLnBrk="1" latinLnBrk="0" hangingPunct="1">
+              <a:lnSpc>
+                <a:spcPct val="110000"/>
+              </a:lnSpc>
+              <a:spcBef>
+                <a:spcPts val="0"/>
+              </a:spcBef>
+              <a:buFont typeface="Arial" panose="020B0604020202020204" pitchFamily="34" charset="0"/>
+              <a:buChar char="–"/>
+              <a:defRPr sz="1900" kern="1200">
+                <a:solidFill>
+                  <a:schemeClr val="tx1"/>
+                </a:solidFill>
+                <a:latin typeface="+mn-lt"/>
+                <a:ea typeface="+mn-ea"/>
+                <a:cs typeface="+mn-cs"/>
+              </a:defRPr>
+            </a:lvl5pPr>
+            <a:lvl6pPr marL="2514600" indent="-228600" algn="l" defTabSz="914400" rtl="0" eaLnBrk="1" latinLnBrk="0" hangingPunct="1">
+              <a:lnSpc>
+                <a:spcPct val="90000"/>
+              </a:lnSpc>
+              <a:spcBef>
+                <a:spcPts val="500"/>
+              </a:spcBef>
+              <a:buFont typeface="Arial" panose="020B0604020202020204" pitchFamily="34" charset="0"/>
+              <a:buChar char="•"/>
+              <a:defRPr sz="1800" kern="1200">
+                <a:solidFill>
+                  <a:schemeClr val="tx1"/>
+                </a:solidFill>
+                <a:latin typeface="+mn-lt"/>
+                <a:ea typeface="+mn-ea"/>
+                <a:cs typeface="+mn-cs"/>
+              </a:defRPr>
+            </a:lvl6pPr>
+            <a:lvl7pPr marL="2971800" indent="-228600" algn="l" defTabSz="914400" rtl="0" eaLnBrk="1" latinLnBrk="0" hangingPunct="1">
+              <a:lnSpc>
+                <a:spcPct val="90000"/>
+              </a:lnSpc>
+              <a:spcBef>
+                <a:spcPts val="500"/>
+              </a:spcBef>
+              <a:buFont typeface="Arial" panose="020B0604020202020204" pitchFamily="34" charset="0"/>
+              <a:buChar char="•"/>
+              <a:defRPr sz="1800" kern="1200">
+                <a:solidFill>
+                  <a:schemeClr val="tx1"/>
+                </a:solidFill>
+                <a:latin typeface="+mn-lt"/>
+                <a:ea typeface="+mn-ea"/>
+                <a:cs typeface="+mn-cs"/>
+              </a:defRPr>
+            </a:lvl7pPr>
+            <a:lvl8pPr marL="3429000" indent="-228600" algn="l" defTabSz="914400" rtl="0" eaLnBrk="1" latinLnBrk="0" hangingPunct="1">
+              <a:lnSpc>
+                <a:spcPct val="90000"/>
+              </a:lnSpc>
+              <a:spcBef>
+                <a:spcPts val="500"/>
+              </a:spcBef>
+              <a:buFont typeface="Arial" panose="020B0604020202020204" pitchFamily="34" charset="0"/>
+              <a:buChar char="•"/>
+              <a:defRPr sz="1800" kern="1200">
+                <a:solidFill>
+                  <a:schemeClr val="tx1"/>
+                </a:solidFill>
+                <a:latin typeface="+mn-lt"/>
+                <a:ea typeface="+mn-ea"/>
+                <a:cs typeface="+mn-cs"/>
+              </a:defRPr>
+            </a:lvl8pPr>
+            <a:lvl9pPr marL="3886200" indent="-228600" algn="l" defTabSz="914400" rtl="0" eaLnBrk="1" latinLnBrk="0" hangingPunct="1">
+              <a:lnSpc>
+                <a:spcPct val="90000"/>
+              </a:lnSpc>
+              <a:spcBef>
+                <a:spcPts val="500"/>
+              </a:spcBef>
+              <a:buFont typeface="Arial" panose="020B0604020202020204" pitchFamily="34" charset="0"/>
+              <a:buChar char="•"/>
+              <a:defRPr sz="1800" kern="1200">
+                <a:solidFill>
+                  <a:schemeClr val="tx1"/>
+                </a:solidFill>
+                <a:latin typeface="+mn-lt"/>
+                <a:ea typeface="+mn-ea"/>
+                <a:cs typeface="+mn-cs"/>
+              </a:defRPr>
+            </a:lvl9pPr>
+          </a:lstStyle>
+          <a:p>
+            <a:r>
+              <a:rPr lang="de-DE" dirty="0"/>
+              <a:t>50 Sekunden bei 1000 </a:t>
+            </a:r>
+            <a:r>
+              <a:rPr lang="de-DE" dirty="0" err="1"/>
+              <a:t>vus</a:t>
+            </a:r>
+            <a:r>
+              <a:rPr lang="de-DE" dirty="0"/>
+              <a:t>.</a:t>
+            </a:r>
+          </a:p>
+          <a:p>
+            <a:r>
+              <a:rPr lang="de-DE" b="0" dirty="0">
+                <a:effectLst/>
+                <a:latin typeface="+mj-lt"/>
+              </a:rPr>
+              <a:t>831 Requests in 50 Sek. </a:t>
+            </a:r>
+            <a:br>
+              <a:rPr lang="de-DE" b="0" dirty="0">
+                <a:effectLst/>
+                <a:latin typeface="+mj-lt"/>
+              </a:rPr>
+            </a:br>
+            <a:r>
+              <a:rPr lang="de-DE" b="0" dirty="0">
+                <a:effectLst/>
+                <a:latin typeface="+mj-lt"/>
+              </a:rPr>
+              <a:t>= </a:t>
+            </a:r>
+            <a:r>
+              <a:rPr lang="de-DE" b="1" dirty="0">
+                <a:effectLst/>
+                <a:latin typeface="+mj-lt"/>
+              </a:rPr>
+              <a:t>16 Requests/Sekunde</a:t>
+            </a:r>
+          </a:p>
+          <a:p>
+            <a:endParaRPr lang="de-DE" dirty="0"/>
+          </a:p>
+        </p:txBody>
+      </p:sp>
+    </p:spTree>
+    <p:extLst>
+      <p:ext uri="{BB962C8B-B14F-4D97-AF65-F5344CB8AC3E}">
+        <p14:creationId xmlns:p14="http://schemas.microsoft.com/office/powerpoint/2010/main" val="302056566"/>
+      </p:ext>
+    </p:extLst>
+  </p:cSld>
+  <p:clrMapOvr>
+    <a:masterClrMapping/>
+  </p:clrMapOvr>
+  <mc:AlternateContent xmlns:mc="http://schemas.openxmlformats.org/markup-compatibility/2006" xmlns:p14="http://schemas.microsoft.com/office/powerpoint/2010/main">
+    <mc:Choice Requires="p14">
+      <p:transition spd="med" p14:dur="700">
+        <p:fade/>
+      </p:transition>
+    </mc:Choice>
+    <mc:Fallback xmlns="">
+      <p:transition spd="med">
+        <p:fade/>
+      </p:transition>
+    </mc:Fallback>
+  </mc:AlternateContent>
+</p:sld>
+</file>
+
+<file path=ppt/slides/slide22.xml><?xml version="1.0" encoding="utf-8"?>
+<p:sld xmlns:a="http://schemas.openxmlformats.org/drawingml/2006/main" xmlns:r="http://schemas.openxmlformats.org/officeDocument/2006/relationships" xmlns:p="http://schemas.openxmlformats.org/presentationml/2006/main">
+  <p:cSld>
+    <p:spTree>
+      <p:nvGrpSpPr>
+        <p:cNvPr id="1" name=""/>
+        <p:cNvGrpSpPr/>
+        <p:nvPr/>
+      </p:nvGrpSpPr>
+      <p:grpSpPr>
+        <a:xfrm>
+          <a:off x="0" y="0"/>
+          <a:ext cx="0" cy="0"/>
+          <a:chOff x="0" y="0"/>
+          <a:chExt cx="0" cy="0"/>
+        </a:xfrm>
+      </p:grpSpPr>
+      <p:sp>
+        <p:nvSpPr>
+          <p:cNvPr id="2" name="Titel 1">
+            <a:extLst>
+              <a:ext uri="{FF2B5EF4-FFF2-40B4-BE49-F238E27FC236}">
+                <a16:creationId xmlns:a16="http://schemas.microsoft.com/office/drawing/2014/main" id="{B22D74DF-2D49-1A74-620A-523203A43A2F}"/>
+              </a:ext>
+            </a:extLst>
+          </p:cNvPr>
+          <p:cNvSpPr>
+            <a:spLocks noGrp="1"/>
+          </p:cNvSpPr>
+          <p:nvPr>
+            <p:ph type="title"/>
+          </p:nvPr>
+        </p:nvSpPr>
+        <p:spPr/>
+        <p:txBody>
+          <a:bodyPr/>
+          <a:lstStyle/>
+          <a:p>
+            <a:r>
+              <a:rPr lang="de-DE" dirty="0"/>
+              <a:t>Neue Ergebnisse</a:t>
+            </a:r>
+          </a:p>
+        </p:txBody>
+      </p:sp>
+      <p:sp>
+        <p:nvSpPr>
+          <p:cNvPr id="8" name="Textplatzhalter 3">
+            <a:extLst>
+              <a:ext uri="{FF2B5EF4-FFF2-40B4-BE49-F238E27FC236}">
+                <a16:creationId xmlns:a16="http://schemas.microsoft.com/office/drawing/2014/main" id="{7308C11C-ACE4-C96A-BC26-915DF956C5C8}"/>
+              </a:ext>
+            </a:extLst>
+          </p:cNvPr>
+          <p:cNvSpPr>
+            <a:spLocks noGrp="1"/>
+          </p:cNvSpPr>
+          <p:nvPr/>
+        </p:nvSpPr>
+        <p:spPr bwMode="auto">
+          <a:xfrm>
+            <a:off x="374723" y="849131"/>
+            <a:ext cx="8820993" cy="504540"/>
+          </a:xfrm>
+          <a:prstGeom prst="rect">
+            <a:avLst/>
+          </a:prstGeom>
+          <a:noFill/>
+          <a:ln>
+            <a:noFill/>
+          </a:ln>
+          <a:extLst>
+            <a:ext uri="{909E8E84-426E-40DD-AFC4-6F175D3DCCD1}">
+              <a14:hiddenFill xmlns:a14="http://schemas.microsoft.com/office/drawing/2010/main">
+                <a:solidFill>
+                  <a:srgbClr val="FFFFFF"/>
+                </a:solidFill>
+              </a14:hiddenFill>
+            </a:ext>
+            <a:ext uri="{91240B29-F687-4F45-9708-019B960494DF}">
+              <a14:hiddenLine xmlns:a14="http://schemas.microsoft.com/office/drawing/2010/main" w="9525">
+                <a:solidFill>
+                  <a:srgbClr val="000000"/>
+                </a:solidFill>
+                <a:miter lim="800000"/>
+                <a:headEnd/>
+                <a:tailEnd/>
+              </a14:hiddenLine>
+            </a:ext>
+          </a:extLst>
+        </p:spPr>
+        <p:txBody>
+          <a:bodyPr vert="horz" wrap="square" lIns="0" tIns="0" rIns="0" bIns="0" numCol="1" anchor="t" anchorCtr="0" compatLnSpc="1">
+            <a:prstTxWarp prst="textNoShape">
+              <a:avLst/>
+            </a:prstTxWarp>
+          </a:bodyPr>
+          <a:lstStyle>
+            <a:lvl1pPr marL="0" indent="0" algn="l" rtl="0" fontAlgn="base">
+              <a:lnSpc>
+                <a:spcPct val="110000"/>
+              </a:lnSpc>
+              <a:spcBef>
+                <a:spcPct val="0"/>
+              </a:spcBef>
+              <a:spcAft>
+                <a:spcPct val="0"/>
+              </a:spcAft>
+              <a:buFont typeface="Arial" panose="020B0604020202020204" pitchFamily="34" charset="0"/>
+              <a:buNone/>
+              <a:defRPr sz="2800" kern="1200">
+                <a:solidFill>
+                  <a:schemeClr val="tx2"/>
+                </a:solidFill>
+                <a:latin typeface="+mn-lt"/>
+                <a:ea typeface="+mn-ea"/>
+                <a:cs typeface="+mn-cs"/>
+              </a:defRPr>
+            </a:lvl1pPr>
+            <a:lvl2pPr marL="984250" indent="-355600" algn="l" rtl="0" fontAlgn="base">
+              <a:lnSpc>
+                <a:spcPct val="110000"/>
+              </a:lnSpc>
+              <a:spcBef>
+                <a:spcPct val="0"/>
+              </a:spcBef>
+              <a:spcAft>
+                <a:spcPct val="0"/>
+              </a:spcAft>
+              <a:buFont typeface="Arial" panose="020B0604020202020204" pitchFamily="34" charset="0"/>
+              <a:buChar char="–"/>
+              <a:defRPr sz="1900" kern="1200">
+                <a:solidFill>
+                  <a:schemeClr val="tx1"/>
+                </a:solidFill>
+                <a:latin typeface="+mn-lt"/>
+                <a:ea typeface="+mn-ea"/>
+                <a:cs typeface="+mn-cs"/>
+              </a:defRPr>
+            </a:lvl2pPr>
+            <a:lvl3pPr marL="1346200" indent="-361950" algn="l" rtl="0" fontAlgn="base">
+              <a:lnSpc>
+                <a:spcPct val="110000"/>
+              </a:lnSpc>
+              <a:spcBef>
+                <a:spcPct val="0"/>
+              </a:spcBef>
+              <a:spcAft>
+                <a:spcPct val="0"/>
+              </a:spcAft>
+              <a:buFont typeface="Arial" panose="020B0604020202020204" pitchFamily="34" charset="0"/>
+              <a:buChar char="–"/>
+              <a:defRPr sz="1900" kern="1200">
+                <a:solidFill>
+                  <a:schemeClr val="tx1"/>
+                </a:solidFill>
+                <a:latin typeface="+mn-lt"/>
+                <a:ea typeface="+mn-ea"/>
+                <a:cs typeface="+mn-cs"/>
+              </a:defRPr>
+            </a:lvl3pPr>
+            <a:lvl4pPr marL="1701800" indent="-355600" algn="l" rtl="0" fontAlgn="base">
+              <a:lnSpc>
+                <a:spcPct val="110000"/>
+              </a:lnSpc>
+              <a:spcBef>
+                <a:spcPct val="0"/>
+              </a:spcBef>
+              <a:spcAft>
+                <a:spcPct val="0"/>
+              </a:spcAft>
+              <a:buFont typeface="Arial" panose="020B0604020202020204" pitchFamily="34" charset="0"/>
+              <a:buChar char="–"/>
+              <a:defRPr sz="1900" kern="1200">
+                <a:solidFill>
+                  <a:schemeClr val="tx1"/>
+                </a:solidFill>
+                <a:latin typeface="+mn-lt"/>
+                <a:ea typeface="+mn-ea"/>
+                <a:cs typeface="+mn-cs"/>
+              </a:defRPr>
+            </a:lvl4pPr>
+            <a:lvl5pPr marL="2063750" indent="-361950" algn="l" rtl="0" fontAlgn="base">
+              <a:lnSpc>
+                <a:spcPct val="110000"/>
+              </a:lnSpc>
+              <a:spcBef>
+                <a:spcPct val="0"/>
+              </a:spcBef>
+              <a:spcAft>
+                <a:spcPct val="0"/>
+              </a:spcAft>
+              <a:buFont typeface="Arial" panose="020B0604020202020204" pitchFamily="34" charset="0"/>
+              <a:buChar char="–"/>
+              <a:defRPr sz="1900" kern="1200">
+                <a:solidFill>
+                  <a:schemeClr val="tx1"/>
+                </a:solidFill>
+                <a:latin typeface="+mn-lt"/>
+                <a:ea typeface="+mn-ea"/>
+                <a:cs typeface="+mn-cs"/>
+              </a:defRPr>
+            </a:lvl5pPr>
+            <a:lvl6pPr marL="2514600" indent="-228600" algn="l" defTabSz="914400" rtl="0" eaLnBrk="1" latinLnBrk="0" hangingPunct="1">
+              <a:lnSpc>
+                <a:spcPct val="90000"/>
+              </a:lnSpc>
+              <a:spcBef>
+                <a:spcPts val="500"/>
+              </a:spcBef>
+              <a:buFont typeface="Arial" panose="020B0604020202020204" pitchFamily="34" charset="0"/>
+              <a:buChar char="•"/>
+              <a:defRPr sz="1800" kern="1200">
+                <a:solidFill>
+                  <a:schemeClr val="tx1"/>
+                </a:solidFill>
+                <a:latin typeface="+mn-lt"/>
+                <a:ea typeface="+mn-ea"/>
+                <a:cs typeface="+mn-cs"/>
+              </a:defRPr>
+            </a:lvl6pPr>
+            <a:lvl7pPr marL="2971800" indent="-228600" algn="l" defTabSz="914400" rtl="0" eaLnBrk="1" latinLnBrk="0" hangingPunct="1">
+              <a:lnSpc>
+                <a:spcPct val="90000"/>
+              </a:lnSpc>
+              <a:spcBef>
+                <a:spcPts val="500"/>
+              </a:spcBef>
+              <a:buFont typeface="Arial" panose="020B0604020202020204" pitchFamily="34" charset="0"/>
+              <a:buChar char="•"/>
+              <a:defRPr sz="1800" kern="1200">
+                <a:solidFill>
+                  <a:schemeClr val="tx1"/>
+                </a:solidFill>
+                <a:latin typeface="+mn-lt"/>
+                <a:ea typeface="+mn-ea"/>
+                <a:cs typeface="+mn-cs"/>
+              </a:defRPr>
+            </a:lvl7pPr>
+            <a:lvl8pPr marL="3429000" indent="-228600" algn="l" defTabSz="914400" rtl="0" eaLnBrk="1" latinLnBrk="0" hangingPunct="1">
+              <a:lnSpc>
+                <a:spcPct val="90000"/>
+              </a:lnSpc>
+              <a:spcBef>
+                <a:spcPts val="500"/>
+              </a:spcBef>
+              <a:buFont typeface="Arial" panose="020B0604020202020204" pitchFamily="34" charset="0"/>
+              <a:buChar char="•"/>
+              <a:defRPr sz="1800" kern="1200">
+                <a:solidFill>
+                  <a:schemeClr val="tx1"/>
+                </a:solidFill>
+                <a:latin typeface="+mn-lt"/>
+                <a:ea typeface="+mn-ea"/>
+                <a:cs typeface="+mn-cs"/>
+              </a:defRPr>
+            </a:lvl8pPr>
+            <a:lvl9pPr marL="3886200" indent="-228600" algn="l" defTabSz="914400" rtl="0" eaLnBrk="1" latinLnBrk="0" hangingPunct="1">
+              <a:lnSpc>
+                <a:spcPct val="90000"/>
+              </a:lnSpc>
+              <a:spcBef>
+                <a:spcPts val="500"/>
+              </a:spcBef>
+              <a:buFont typeface="Arial" panose="020B0604020202020204" pitchFamily="34" charset="0"/>
+              <a:buChar char="•"/>
+              <a:defRPr sz="1800" kern="1200">
+                <a:solidFill>
+                  <a:schemeClr val="tx1"/>
+                </a:solidFill>
+                <a:latin typeface="+mn-lt"/>
+                <a:ea typeface="+mn-ea"/>
+                <a:cs typeface="+mn-cs"/>
+              </a:defRPr>
+            </a:lvl9pPr>
+          </a:lstStyle>
+          <a:p>
+            <a:r>
+              <a:rPr lang="de-DE" dirty="0">
+                <a:cs typeface="Arial"/>
+              </a:rPr>
+              <a:t>Reaktive</a:t>
+            </a:r>
+            <a:endParaRPr lang="de-DE" dirty="0"/>
+          </a:p>
+        </p:txBody>
+      </p:sp>
+      <p:sp>
+        <p:nvSpPr>
+          <p:cNvPr id="5" name="Inhaltsplatzhalter 2">
+            <a:extLst>
+              <a:ext uri="{FF2B5EF4-FFF2-40B4-BE49-F238E27FC236}">
+                <a16:creationId xmlns:a16="http://schemas.microsoft.com/office/drawing/2014/main" id="{10983D68-22A8-E9A5-C4F6-235367235DFF}"/>
+              </a:ext>
+            </a:extLst>
+          </p:cNvPr>
+          <p:cNvSpPr txBox="1">
+            <a:spLocks/>
+          </p:cNvSpPr>
+          <p:nvPr/>
+        </p:nvSpPr>
+        <p:spPr>
+          <a:xfrm>
+            <a:off x="8893835" y="1604682"/>
+            <a:ext cx="3190216" cy="4200582"/>
+          </a:xfrm>
+          <a:prstGeom prst="rect">
+            <a:avLst/>
+          </a:prstGeom>
+        </p:spPr>
+        <p:txBody>
+          <a:bodyPr vert="horz" lIns="0" tIns="0" rIns="0" bIns="0" rtlCol="0" anchor="t" anchorCtr="0">
+            <a:noAutofit/>
+          </a:bodyPr>
+          <a:lstStyle>
+            <a:lvl1pPr marL="355600" indent="-355600" algn="l" defTabSz="914400" rtl="0" eaLnBrk="1" latinLnBrk="0" hangingPunct="1">
+              <a:lnSpc>
+                <a:spcPct val="110000"/>
+              </a:lnSpc>
+              <a:spcBef>
+                <a:spcPts val="0"/>
+              </a:spcBef>
+              <a:buClr>
+                <a:srgbClr val="0014A0"/>
+              </a:buClr>
+              <a:buFont typeface="Arial" panose="020B0604020202020204" pitchFamily="34" charset="0"/>
+              <a:buChar char="•"/>
+              <a:defRPr sz="1900" kern="1200">
+                <a:solidFill>
+                  <a:schemeClr val="tx1"/>
+                </a:solidFill>
+                <a:latin typeface="+mn-lt"/>
+                <a:ea typeface="+mn-ea"/>
+                <a:cs typeface="+mn-cs"/>
+              </a:defRPr>
+            </a:lvl1pPr>
+            <a:lvl2pPr marL="984250" indent="-355600" algn="l" defTabSz="914400" rtl="0" eaLnBrk="1" latinLnBrk="0" hangingPunct="1">
+              <a:lnSpc>
+                <a:spcPct val="110000"/>
+              </a:lnSpc>
+              <a:spcBef>
+                <a:spcPts val="0"/>
+              </a:spcBef>
+              <a:buFont typeface="Arial" panose="020B0604020202020204" pitchFamily="34" charset="0"/>
+              <a:buChar char="–"/>
+              <a:defRPr sz="1900" kern="1200">
+                <a:solidFill>
+                  <a:schemeClr val="tx1"/>
+                </a:solidFill>
+                <a:latin typeface="+mn-lt"/>
+                <a:ea typeface="+mn-ea"/>
+                <a:cs typeface="+mn-cs"/>
+              </a:defRPr>
+            </a:lvl2pPr>
+            <a:lvl3pPr marL="1346200" indent="-361950" algn="l" defTabSz="914400" rtl="0" eaLnBrk="1" latinLnBrk="0" hangingPunct="1">
+              <a:lnSpc>
+                <a:spcPct val="110000"/>
+              </a:lnSpc>
+              <a:spcBef>
+                <a:spcPts val="0"/>
+              </a:spcBef>
+              <a:buFont typeface="Arial" panose="020B0604020202020204" pitchFamily="34" charset="0"/>
+              <a:buChar char="–"/>
+              <a:defRPr sz="1900" kern="1200">
+                <a:solidFill>
+                  <a:schemeClr val="tx1"/>
+                </a:solidFill>
+                <a:latin typeface="+mn-lt"/>
+                <a:ea typeface="+mn-ea"/>
+                <a:cs typeface="+mn-cs"/>
+              </a:defRPr>
+            </a:lvl3pPr>
+            <a:lvl4pPr marL="1701800" indent="-355600" algn="l" defTabSz="914400" rtl="0" eaLnBrk="1" latinLnBrk="0" hangingPunct="1">
+              <a:lnSpc>
+                <a:spcPct val="110000"/>
+              </a:lnSpc>
+              <a:spcBef>
+                <a:spcPts val="0"/>
+              </a:spcBef>
+              <a:buFont typeface="Arial" panose="020B0604020202020204" pitchFamily="34" charset="0"/>
+              <a:buChar char="–"/>
+              <a:defRPr sz="1900" kern="1200">
+                <a:solidFill>
+                  <a:schemeClr val="tx1"/>
+                </a:solidFill>
+                <a:latin typeface="+mn-lt"/>
+                <a:ea typeface="+mn-ea"/>
+                <a:cs typeface="+mn-cs"/>
+              </a:defRPr>
+            </a:lvl4pPr>
+            <a:lvl5pPr marL="2063750" indent="-361950" algn="l" defTabSz="914400" rtl="0" eaLnBrk="1" latinLnBrk="0" hangingPunct="1">
+              <a:lnSpc>
+                <a:spcPct val="110000"/>
+              </a:lnSpc>
+              <a:spcBef>
+                <a:spcPts val="0"/>
+              </a:spcBef>
+              <a:buFont typeface="Arial" panose="020B0604020202020204" pitchFamily="34" charset="0"/>
+              <a:buChar char="–"/>
+              <a:defRPr sz="1900" kern="1200">
+                <a:solidFill>
+                  <a:schemeClr val="tx1"/>
+                </a:solidFill>
+                <a:latin typeface="+mn-lt"/>
+                <a:ea typeface="+mn-ea"/>
+                <a:cs typeface="+mn-cs"/>
+              </a:defRPr>
+            </a:lvl5pPr>
+            <a:lvl6pPr marL="2514600" indent="-228600" algn="l" defTabSz="914400" rtl="0" eaLnBrk="1" latinLnBrk="0" hangingPunct="1">
+              <a:lnSpc>
+                <a:spcPct val="90000"/>
+              </a:lnSpc>
+              <a:spcBef>
+                <a:spcPts val="500"/>
+              </a:spcBef>
+              <a:buFont typeface="Arial" panose="020B0604020202020204" pitchFamily="34" charset="0"/>
+              <a:buChar char="•"/>
+              <a:defRPr sz="1800" kern="1200">
+                <a:solidFill>
+                  <a:schemeClr val="tx1"/>
+                </a:solidFill>
+                <a:latin typeface="+mn-lt"/>
+                <a:ea typeface="+mn-ea"/>
+                <a:cs typeface="+mn-cs"/>
+              </a:defRPr>
+            </a:lvl6pPr>
+            <a:lvl7pPr marL="2971800" indent="-228600" algn="l" defTabSz="914400" rtl="0" eaLnBrk="1" latinLnBrk="0" hangingPunct="1">
+              <a:lnSpc>
+                <a:spcPct val="90000"/>
+              </a:lnSpc>
+              <a:spcBef>
+                <a:spcPts val="500"/>
+              </a:spcBef>
+              <a:buFont typeface="Arial" panose="020B0604020202020204" pitchFamily="34" charset="0"/>
+              <a:buChar char="•"/>
+              <a:defRPr sz="1800" kern="1200">
+                <a:solidFill>
+                  <a:schemeClr val="tx1"/>
+                </a:solidFill>
+                <a:latin typeface="+mn-lt"/>
+                <a:ea typeface="+mn-ea"/>
+                <a:cs typeface="+mn-cs"/>
+              </a:defRPr>
+            </a:lvl7pPr>
+            <a:lvl8pPr marL="3429000" indent="-228600" algn="l" defTabSz="914400" rtl="0" eaLnBrk="1" latinLnBrk="0" hangingPunct="1">
+              <a:lnSpc>
+                <a:spcPct val="90000"/>
+              </a:lnSpc>
+              <a:spcBef>
+                <a:spcPts val="500"/>
+              </a:spcBef>
+              <a:buFont typeface="Arial" panose="020B0604020202020204" pitchFamily="34" charset="0"/>
+              <a:buChar char="•"/>
+              <a:defRPr sz="1800" kern="1200">
+                <a:solidFill>
+                  <a:schemeClr val="tx1"/>
+                </a:solidFill>
+                <a:latin typeface="+mn-lt"/>
+                <a:ea typeface="+mn-ea"/>
+                <a:cs typeface="+mn-cs"/>
+              </a:defRPr>
+            </a:lvl8pPr>
+            <a:lvl9pPr marL="3886200" indent="-228600" algn="l" defTabSz="914400" rtl="0" eaLnBrk="1" latinLnBrk="0" hangingPunct="1">
+              <a:lnSpc>
+                <a:spcPct val="90000"/>
+              </a:lnSpc>
+              <a:spcBef>
+                <a:spcPts val="500"/>
+              </a:spcBef>
+              <a:buFont typeface="Arial" panose="020B0604020202020204" pitchFamily="34" charset="0"/>
+              <a:buChar char="•"/>
+              <a:defRPr sz="1800" kern="1200">
+                <a:solidFill>
+                  <a:schemeClr val="tx1"/>
+                </a:solidFill>
+                <a:latin typeface="+mn-lt"/>
+                <a:ea typeface="+mn-ea"/>
+                <a:cs typeface="+mn-cs"/>
+              </a:defRPr>
+            </a:lvl9pPr>
+          </a:lstStyle>
+          <a:p>
+            <a:r>
+              <a:rPr lang="de-DE" dirty="0"/>
+              <a:t>50 Sekunden bei 1000 </a:t>
+            </a:r>
+            <a:r>
+              <a:rPr lang="de-DE" dirty="0" err="1"/>
+              <a:t>vus</a:t>
+            </a:r>
+            <a:r>
+              <a:rPr lang="de-DE" dirty="0"/>
+              <a:t>.</a:t>
+            </a:r>
+          </a:p>
+          <a:p>
+            <a:r>
+              <a:rPr lang="de-DE" b="0" dirty="0">
+                <a:effectLst/>
+                <a:latin typeface="+mj-lt"/>
+              </a:rPr>
+              <a:t>416 Requests in 50 Sek. </a:t>
+            </a:r>
+            <a:br>
+              <a:rPr lang="de-DE" b="0" dirty="0">
+                <a:effectLst/>
+                <a:latin typeface="+mj-lt"/>
+              </a:rPr>
+            </a:br>
+            <a:r>
+              <a:rPr lang="de-DE" b="0" dirty="0">
+                <a:effectLst/>
+                <a:latin typeface="+mj-lt"/>
+              </a:rPr>
+              <a:t>= </a:t>
+            </a:r>
+            <a:r>
+              <a:rPr lang="de-DE" b="1" dirty="0">
+                <a:effectLst/>
+                <a:latin typeface="+mj-lt"/>
+              </a:rPr>
+              <a:t>8,2 Requests/Sekunde</a:t>
+            </a:r>
+          </a:p>
+          <a:p>
+            <a:endParaRPr lang="de-DE" dirty="0"/>
+          </a:p>
+        </p:txBody>
+      </p:sp>
+      <p:pic>
+        <p:nvPicPr>
+          <p:cNvPr id="6" name="Grafik 5" descr="Ein Bild, das Text, Diagramm, Reihe, parallel enthält.&#10;&#10;Automatisch generierte Beschreibung">
+            <a:extLst>
+              <a:ext uri="{FF2B5EF4-FFF2-40B4-BE49-F238E27FC236}">
+                <a16:creationId xmlns:a16="http://schemas.microsoft.com/office/drawing/2014/main" id="{50F97D9B-AEE0-053A-BDC8-9B7A09FBC918}"/>
+              </a:ext>
+            </a:extLst>
+          </p:cNvPr>
+          <p:cNvPicPr>
+            <a:picLocks noChangeAspect="1"/>
+          </p:cNvPicPr>
+          <p:nvPr/>
+        </p:nvPicPr>
+        <p:blipFill>
+          <a:blip r:embed="rId2">
+            <a:extLst>
+              <a:ext uri="{28A0092B-C50C-407E-A947-70E740481C1C}">
+                <a14:useLocalDpi xmlns:a14="http://schemas.microsoft.com/office/drawing/2010/main" val="0"/>
+              </a:ext>
+            </a:extLst>
+          </a:blip>
+          <a:stretch>
+            <a:fillRect/>
+          </a:stretch>
+        </p:blipFill>
+        <p:spPr>
+          <a:xfrm>
+            <a:off x="1" y="1419151"/>
+            <a:ext cx="8820994" cy="4803809"/>
+          </a:xfrm>
+          <a:prstGeom prst="rect">
+            <a:avLst/>
+          </a:prstGeom>
+        </p:spPr>
+      </p:pic>
+    </p:spTree>
+    <p:extLst>
+      <p:ext uri="{BB962C8B-B14F-4D97-AF65-F5344CB8AC3E}">
+        <p14:creationId xmlns:p14="http://schemas.microsoft.com/office/powerpoint/2010/main" val="1783429619"/>
+      </p:ext>
+    </p:extLst>
+  </p:cSld>
+  <p:clrMapOvr>
+    <a:masterClrMapping/>
+  </p:clrMapOvr>
+  <mc:AlternateContent xmlns:mc="http://schemas.openxmlformats.org/markup-compatibility/2006" xmlns:p14="http://schemas.microsoft.com/office/powerpoint/2010/main">
+    <mc:Choice Requires="p14">
+      <p:transition spd="med" p14:dur="700">
+        <p:fade/>
+      </p:transition>
+    </mc:Choice>
+    <mc:Fallback xmlns="">
+      <p:transition spd="med">
+        <p:fade/>
+      </p:transition>
+    </mc:Fallback>
+  </mc:AlternateContent>
+</p:sld>
+</file>
+
+<file path=ppt/slides/slide23.xml><?xml version="1.0" encoding="utf-8"?>
+<p:sld xmlns:a="http://schemas.openxmlformats.org/drawingml/2006/main" xmlns:r="http://schemas.openxmlformats.org/officeDocument/2006/relationships" xmlns:p="http://schemas.openxmlformats.org/presentationml/2006/main">
+  <p:cSld>
+    <p:spTree>
+      <p:nvGrpSpPr>
+        <p:cNvPr id="1" name=""/>
+        <p:cNvGrpSpPr/>
+        <p:nvPr/>
+      </p:nvGrpSpPr>
+      <p:grpSpPr>
+        <a:xfrm>
+          <a:off x="0" y="0"/>
+          <a:ext cx="0" cy="0"/>
+          <a:chOff x="0" y="0"/>
+          <a:chExt cx="0" cy="0"/>
+        </a:xfrm>
+      </p:grpSpPr>
+      <p:sp>
+        <p:nvSpPr>
+          <p:cNvPr id="2" name="Titel 1">
+            <a:extLst>
+              <a:ext uri="{FF2B5EF4-FFF2-40B4-BE49-F238E27FC236}">
+                <a16:creationId xmlns:a16="http://schemas.microsoft.com/office/drawing/2014/main" id="{B22D74DF-2D49-1A74-620A-523203A43A2F}"/>
+              </a:ext>
+            </a:extLst>
+          </p:cNvPr>
+          <p:cNvSpPr>
+            <a:spLocks noGrp="1"/>
+          </p:cNvSpPr>
+          <p:nvPr>
+            <p:ph type="title"/>
+          </p:nvPr>
+        </p:nvSpPr>
+        <p:spPr/>
+        <p:txBody>
+          <a:bodyPr/>
+          <a:lstStyle/>
+          <a:p>
+            <a:r>
+              <a:rPr lang="de-DE" dirty="0"/>
+              <a:t>Neue Ergebnisse</a:t>
+            </a:r>
+          </a:p>
+        </p:txBody>
+      </p:sp>
+      <p:sp>
+        <p:nvSpPr>
+          <p:cNvPr id="8" name="Textplatzhalter 3">
+            <a:extLst>
+              <a:ext uri="{FF2B5EF4-FFF2-40B4-BE49-F238E27FC236}">
+                <a16:creationId xmlns:a16="http://schemas.microsoft.com/office/drawing/2014/main" id="{7308C11C-ACE4-C96A-BC26-915DF956C5C8}"/>
+              </a:ext>
+            </a:extLst>
+          </p:cNvPr>
+          <p:cNvSpPr>
+            <a:spLocks noGrp="1"/>
+          </p:cNvSpPr>
+          <p:nvPr/>
+        </p:nvSpPr>
+        <p:spPr bwMode="auto">
+          <a:xfrm>
+            <a:off x="374723" y="849131"/>
+            <a:ext cx="8820993" cy="504540"/>
+          </a:xfrm>
+          <a:prstGeom prst="rect">
+            <a:avLst/>
+          </a:prstGeom>
+          <a:noFill/>
+          <a:ln>
+            <a:noFill/>
+          </a:ln>
+          <a:extLst>
+            <a:ext uri="{909E8E84-426E-40DD-AFC4-6F175D3DCCD1}">
+              <a14:hiddenFill xmlns:a14="http://schemas.microsoft.com/office/drawing/2010/main">
+                <a:solidFill>
+                  <a:srgbClr val="FFFFFF"/>
+                </a:solidFill>
+              </a14:hiddenFill>
+            </a:ext>
+            <a:ext uri="{91240B29-F687-4F45-9708-019B960494DF}">
+              <a14:hiddenLine xmlns:a14="http://schemas.microsoft.com/office/drawing/2010/main" w="9525">
+                <a:solidFill>
+                  <a:srgbClr val="000000"/>
+                </a:solidFill>
+                <a:miter lim="800000"/>
+                <a:headEnd/>
+                <a:tailEnd/>
+              </a14:hiddenLine>
+            </a:ext>
+          </a:extLst>
+        </p:spPr>
+        <p:txBody>
+          <a:bodyPr vert="horz" wrap="square" lIns="0" tIns="0" rIns="0" bIns="0" numCol="1" anchor="t" anchorCtr="0" compatLnSpc="1">
+            <a:prstTxWarp prst="textNoShape">
+              <a:avLst/>
+            </a:prstTxWarp>
+          </a:bodyPr>
+          <a:lstStyle>
+            <a:lvl1pPr marL="0" indent="0" algn="l" rtl="0" fontAlgn="base">
+              <a:lnSpc>
+                <a:spcPct val="110000"/>
+              </a:lnSpc>
+              <a:spcBef>
+                <a:spcPct val="0"/>
+              </a:spcBef>
+              <a:spcAft>
+                <a:spcPct val="0"/>
+              </a:spcAft>
+              <a:buFont typeface="Arial" panose="020B0604020202020204" pitchFamily="34" charset="0"/>
+              <a:buNone/>
+              <a:defRPr sz="2800" kern="1200">
+                <a:solidFill>
+                  <a:schemeClr val="tx2"/>
+                </a:solidFill>
+                <a:latin typeface="+mn-lt"/>
+                <a:ea typeface="+mn-ea"/>
+                <a:cs typeface="+mn-cs"/>
+              </a:defRPr>
+            </a:lvl1pPr>
+            <a:lvl2pPr marL="984250" indent="-355600" algn="l" rtl="0" fontAlgn="base">
+              <a:lnSpc>
+                <a:spcPct val="110000"/>
+              </a:lnSpc>
+              <a:spcBef>
+                <a:spcPct val="0"/>
+              </a:spcBef>
+              <a:spcAft>
+                <a:spcPct val="0"/>
+              </a:spcAft>
+              <a:buFont typeface="Arial" panose="020B0604020202020204" pitchFamily="34" charset="0"/>
+              <a:buChar char="–"/>
+              <a:defRPr sz="1900" kern="1200">
+                <a:solidFill>
+                  <a:schemeClr val="tx1"/>
+                </a:solidFill>
+                <a:latin typeface="+mn-lt"/>
+                <a:ea typeface="+mn-ea"/>
+                <a:cs typeface="+mn-cs"/>
+              </a:defRPr>
+            </a:lvl2pPr>
+            <a:lvl3pPr marL="1346200" indent="-361950" algn="l" rtl="0" fontAlgn="base">
+              <a:lnSpc>
+                <a:spcPct val="110000"/>
+              </a:lnSpc>
+              <a:spcBef>
+                <a:spcPct val="0"/>
+              </a:spcBef>
+              <a:spcAft>
+                <a:spcPct val="0"/>
+              </a:spcAft>
+              <a:buFont typeface="Arial" panose="020B0604020202020204" pitchFamily="34" charset="0"/>
+              <a:buChar char="–"/>
+              <a:defRPr sz="1900" kern="1200">
+                <a:solidFill>
+                  <a:schemeClr val="tx1"/>
+                </a:solidFill>
+                <a:latin typeface="+mn-lt"/>
+                <a:ea typeface="+mn-ea"/>
+                <a:cs typeface="+mn-cs"/>
+              </a:defRPr>
+            </a:lvl3pPr>
+            <a:lvl4pPr marL="1701800" indent="-355600" algn="l" rtl="0" fontAlgn="base">
+              <a:lnSpc>
+                <a:spcPct val="110000"/>
+              </a:lnSpc>
+              <a:spcBef>
+                <a:spcPct val="0"/>
+              </a:spcBef>
+              <a:spcAft>
+                <a:spcPct val="0"/>
+              </a:spcAft>
+              <a:buFont typeface="Arial" panose="020B0604020202020204" pitchFamily="34" charset="0"/>
+              <a:buChar char="–"/>
+              <a:defRPr sz="1900" kern="1200">
+                <a:solidFill>
+                  <a:schemeClr val="tx1"/>
+                </a:solidFill>
+                <a:latin typeface="+mn-lt"/>
+                <a:ea typeface="+mn-ea"/>
+                <a:cs typeface="+mn-cs"/>
+              </a:defRPr>
+            </a:lvl4pPr>
+            <a:lvl5pPr marL="2063750" indent="-361950" algn="l" rtl="0" fontAlgn="base">
+              <a:lnSpc>
+                <a:spcPct val="110000"/>
+              </a:lnSpc>
+              <a:spcBef>
+                <a:spcPct val="0"/>
+              </a:spcBef>
+              <a:spcAft>
+                <a:spcPct val="0"/>
+              </a:spcAft>
+              <a:buFont typeface="Arial" panose="020B0604020202020204" pitchFamily="34" charset="0"/>
+              <a:buChar char="–"/>
+              <a:defRPr sz="1900" kern="1200">
+                <a:solidFill>
+                  <a:schemeClr val="tx1"/>
+                </a:solidFill>
+                <a:latin typeface="+mn-lt"/>
+                <a:ea typeface="+mn-ea"/>
+                <a:cs typeface="+mn-cs"/>
+              </a:defRPr>
+            </a:lvl5pPr>
+            <a:lvl6pPr marL="2514600" indent="-228600" algn="l" defTabSz="914400" rtl="0" eaLnBrk="1" latinLnBrk="0" hangingPunct="1">
+              <a:lnSpc>
+                <a:spcPct val="90000"/>
+              </a:lnSpc>
+              <a:spcBef>
+                <a:spcPts val="500"/>
+              </a:spcBef>
+              <a:buFont typeface="Arial" panose="020B0604020202020204" pitchFamily="34" charset="0"/>
+              <a:buChar char="•"/>
+              <a:defRPr sz="1800" kern="1200">
+                <a:solidFill>
+                  <a:schemeClr val="tx1"/>
+                </a:solidFill>
+                <a:latin typeface="+mn-lt"/>
+                <a:ea typeface="+mn-ea"/>
+                <a:cs typeface="+mn-cs"/>
+              </a:defRPr>
+            </a:lvl6pPr>
+            <a:lvl7pPr marL="2971800" indent="-228600" algn="l" defTabSz="914400" rtl="0" eaLnBrk="1" latinLnBrk="0" hangingPunct="1">
+              <a:lnSpc>
+                <a:spcPct val="90000"/>
+              </a:lnSpc>
+              <a:spcBef>
+                <a:spcPts val="500"/>
+              </a:spcBef>
+              <a:buFont typeface="Arial" panose="020B0604020202020204" pitchFamily="34" charset="0"/>
+              <a:buChar char="•"/>
+              <a:defRPr sz="1800" kern="1200">
+                <a:solidFill>
+                  <a:schemeClr val="tx1"/>
+                </a:solidFill>
+                <a:latin typeface="+mn-lt"/>
+                <a:ea typeface="+mn-ea"/>
+                <a:cs typeface="+mn-cs"/>
+              </a:defRPr>
+            </a:lvl7pPr>
+            <a:lvl8pPr marL="3429000" indent="-228600" algn="l" defTabSz="914400" rtl="0" eaLnBrk="1" latinLnBrk="0" hangingPunct="1">
+              <a:lnSpc>
+                <a:spcPct val="90000"/>
+              </a:lnSpc>
+              <a:spcBef>
+                <a:spcPts val="500"/>
+              </a:spcBef>
+              <a:buFont typeface="Arial" panose="020B0604020202020204" pitchFamily="34" charset="0"/>
+              <a:buChar char="•"/>
+              <a:defRPr sz="1800" kern="1200">
+                <a:solidFill>
+                  <a:schemeClr val="tx1"/>
+                </a:solidFill>
+                <a:latin typeface="+mn-lt"/>
+                <a:ea typeface="+mn-ea"/>
+                <a:cs typeface="+mn-cs"/>
+              </a:defRPr>
+            </a:lvl8pPr>
+            <a:lvl9pPr marL="3886200" indent="-228600" algn="l" defTabSz="914400" rtl="0" eaLnBrk="1" latinLnBrk="0" hangingPunct="1">
+              <a:lnSpc>
+                <a:spcPct val="90000"/>
+              </a:lnSpc>
+              <a:spcBef>
+                <a:spcPts val="500"/>
+              </a:spcBef>
+              <a:buFont typeface="Arial" panose="020B0604020202020204" pitchFamily="34" charset="0"/>
+              <a:buChar char="•"/>
+              <a:defRPr sz="1800" kern="1200">
+                <a:solidFill>
+                  <a:schemeClr val="tx1"/>
+                </a:solidFill>
+                <a:latin typeface="+mn-lt"/>
+                <a:ea typeface="+mn-ea"/>
+                <a:cs typeface="+mn-cs"/>
+              </a:defRPr>
+            </a:lvl9pPr>
+          </a:lstStyle>
+          <a:p>
+            <a:r>
+              <a:rPr lang="de-DE" dirty="0">
+                <a:cs typeface="Arial"/>
+              </a:rPr>
+              <a:t>Normal</a:t>
+            </a:r>
+            <a:endParaRPr lang="de-DE" dirty="0"/>
+          </a:p>
+        </p:txBody>
+      </p:sp>
+      <p:sp>
+        <p:nvSpPr>
+          <p:cNvPr id="5" name="Inhaltsplatzhalter 2">
+            <a:extLst>
+              <a:ext uri="{FF2B5EF4-FFF2-40B4-BE49-F238E27FC236}">
+                <a16:creationId xmlns:a16="http://schemas.microsoft.com/office/drawing/2014/main" id="{10983D68-22A8-E9A5-C4F6-235367235DFF}"/>
+              </a:ext>
+            </a:extLst>
+          </p:cNvPr>
+          <p:cNvSpPr txBox="1">
+            <a:spLocks/>
+          </p:cNvSpPr>
+          <p:nvPr/>
+        </p:nvSpPr>
+        <p:spPr>
+          <a:xfrm>
+            <a:off x="7648053" y="1548547"/>
+            <a:ext cx="3095325" cy="4200582"/>
+          </a:xfrm>
+          <a:prstGeom prst="rect">
+            <a:avLst/>
+          </a:prstGeom>
+        </p:spPr>
+        <p:txBody>
+          <a:bodyPr vert="horz" lIns="0" tIns="0" rIns="0" bIns="0" rtlCol="0" anchor="t" anchorCtr="0">
+            <a:noAutofit/>
+          </a:bodyPr>
+          <a:lstStyle>
+            <a:lvl1pPr marL="355600" indent="-355600" algn="l" defTabSz="914400" rtl="0" eaLnBrk="1" latinLnBrk="0" hangingPunct="1">
+              <a:lnSpc>
+                <a:spcPct val="110000"/>
+              </a:lnSpc>
+              <a:spcBef>
+                <a:spcPts val="0"/>
+              </a:spcBef>
+              <a:buClr>
+                <a:srgbClr val="0014A0"/>
+              </a:buClr>
+              <a:buFont typeface="Arial" panose="020B0604020202020204" pitchFamily="34" charset="0"/>
+              <a:buChar char="•"/>
+              <a:defRPr sz="1900" kern="1200">
+                <a:solidFill>
+                  <a:schemeClr val="tx1"/>
+                </a:solidFill>
+                <a:latin typeface="+mn-lt"/>
+                <a:ea typeface="+mn-ea"/>
+                <a:cs typeface="+mn-cs"/>
+              </a:defRPr>
+            </a:lvl1pPr>
+            <a:lvl2pPr marL="984250" indent="-355600" algn="l" defTabSz="914400" rtl="0" eaLnBrk="1" latinLnBrk="0" hangingPunct="1">
+              <a:lnSpc>
+                <a:spcPct val="110000"/>
+              </a:lnSpc>
+              <a:spcBef>
+                <a:spcPts val="0"/>
+              </a:spcBef>
+              <a:buFont typeface="Arial" panose="020B0604020202020204" pitchFamily="34" charset="0"/>
+              <a:buChar char="–"/>
+              <a:defRPr sz="1900" kern="1200">
+                <a:solidFill>
+                  <a:schemeClr val="tx1"/>
+                </a:solidFill>
+                <a:latin typeface="+mn-lt"/>
+                <a:ea typeface="+mn-ea"/>
+                <a:cs typeface="+mn-cs"/>
+              </a:defRPr>
+            </a:lvl2pPr>
+            <a:lvl3pPr marL="1346200" indent="-361950" algn="l" defTabSz="914400" rtl="0" eaLnBrk="1" latinLnBrk="0" hangingPunct="1">
+              <a:lnSpc>
+                <a:spcPct val="110000"/>
+              </a:lnSpc>
+              <a:spcBef>
+                <a:spcPts val="0"/>
+              </a:spcBef>
+              <a:buFont typeface="Arial" panose="020B0604020202020204" pitchFamily="34" charset="0"/>
+              <a:buChar char="–"/>
+              <a:defRPr sz="1900" kern="1200">
+                <a:solidFill>
+                  <a:schemeClr val="tx1"/>
+                </a:solidFill>
+                <a:latin typeface="+mn-lt"/>
+                <a:ea typeface="+mn-ea"/>
+                <a:cs typeface="+mn-cs"/>
+              </a:defRPr>
+            </a:lvl3pPr>
+            <a:lvl4pPr marL="1701800" indent="-355600" algn="l" defTabSz="914400" rtl="0" eaLnBrk="1" latinLnBrk="0" hangingPunct="1">
+              <a:lnSpc>
+                <a:spcPct val="110000"/>
+              </a:lnSpc>
+              <a:spcBef>
+                <a:spcPts val="0"/>
+              </a:spcBef>
+              <a:buFont typeface="Arial" panose="020B0604020202020204" pitchFamily="34" charset="0"/>
+              <a:buChar char="–"/>
+              <a:defRPr sz="1900" kern="1200">
+                <a:solidFill>
+                  <a:schemeClr val="tx1"/>
+                </a:solidFill>
+                <a:latin typeface="+mn-lt"/>
+                <a:ea typeface="+mn-ea"/>
+                <a:cs typeface="+mn-cs"/>
+              </a:defRPr>
+            </a:lvl4pPr>
+            <a:lvl5pPr marL="2063750" indent="-361950" algn="l" defTabSz="914400" rtl="0" eaLnBrk="1" latinLnBrk="0" hangingPunct="1">
+              <a:lnSpc>
+                <a:spcPct val="110000"/>
+              </a:lnSpc>
+              <a:spcBef>
+                <a:spcPts val="0"/>
+              </a:spcBef>
+              <a:buFont typeface="Arial" panose="020B0604020202020204" pitchFamily="34" charset="0"/>
+              <a:buChar char="–"/>
+              <a:defRPr sz="1900" kern="1200">
+                <a:solidFill>
+                  <a:schemeClr val="tx1"/>
+                </a:solidFill>
+                <a:latin typeface="+mn-lt"/>
+                <a:ea typeface="+mn-ea"/>
+                <a:cs typeface="+mn-cs"/>
+              </a:defRPr>
+            </a:lvl5pPr>
+            <a:lvl6pPr marL="2514600" indent="-228600" algn="l" defTabSz="914400" rtl="0" eaLnBrk="1" latinLnBrk="0" hangingPunct="1">
+              <a:lnSpc>
+                <a:spcPct val="90000"/>
+              </a:lnSpc>
+              <a:spcBef>
+                <a:spcPts val="500"/>
+              </a:spcBef>
+              <a:buFont typeface="Arial" panose="020B0604020202020204" pitchFamily="34" charset="0"/>
+              <a:buChar char="•"/>
+              <a:defRPr sz="1800" kern="1200">
+                <a:solidFill>
+                  <a:schemeClr val="tx1"/>
+                </a:solidFill>
+                <a:latin typeface="+mn-lt"/>
+                <a:ea typeface="+mn-ea"/>
+                <a:cs typeface="+mn-cs"/>
+              </a:defRPr>
+            </a:lvl6pPr>
+            <a:lvl7pPr marL="2971800" indent="-228600" algn="l" defTabSz="914400" rtl="0" eaLnBrk="1" latinLnBrk="0" hangingPunct="1">
+              <a:lnSpc>
+                <a:spcPct val="90000"/>
+              </a:lnSpc>
+              <a:spcBef>
+                <a:spcPts val="500"/>
+              </a:spcBef>
+              <a:buFont typeface="Arial" panose="020B0604020202020204" pitchFamily="34" charset="0"/>
+              <a:buChar char="•"/>
+              <a:defRPr sz="1800" kern="1200">
+                <a:solidFill>
+                  <a:schemeClr val="tx1"/>
+                </a:solidFill>
+                <a:latin typeface="+mn-lt"/>
+                <a:ea typeface="+mn-ea"/>
+                <a:cs typeface="+mn-cs"/>
+              </a:defRPr>
+            </a:lvl7pPr>
+            <a:lvl8pPr marL="3429000" indent="-228600" algn="l" defTabSz="914400" rtl="0" eaLnBrk="1" latinLnBrk="0" hangingPunct="1">
+              <a:lnSpc>
+                <a:spcPct val="90000"/>
+              </a:lnSpc>
+              <a:spcBef>
+                <a:spcPts val="500"/>
+              </a:spcBef>
+              <a:buFont typeface="Arial" panose="020B0604020202020204" pitchFamily="34" charset="0"/>
+              <a:buChar char="•"/>
+              <a:defRPr sz="1800" kern="1200">
+                <a:solidFill>
+                  <a:schemeClr val="tx1"/>
+                </a:solidFill>
+                <a:latin typeface="+mn-lt"/>
+                <a:ea typeface="+mn-ea"/>
+                <a:cs typeface="+mn-cs"/>
+              </a:defRPr>
+            </a:lvl8pPr>
+            <a:lvl9pPr marL="3886200" indent="-228600" algn="l" defTabSz="914400" rtl="0" eaLnBrk="1" latinLnBrk="0" hangingPunct="1">
+              <a:lnSpc>
+                <a:spcPct val="90000"/>
+              </a:lnSpc>
+              <a:spcBef>
+                <a:spcPts val="500"/>
+              </a:spcBef>
+              <a:buFont typeface="Arial" panose="020B0604020202020204" pitchFamily="34" charset="0"/>
+              <a:buChar char="•"/>
+              <a:defRPr sz="1800" kern="1200">
+                <a:solidFill>
+                  <a:schemeClr val="tx1"/>
+                </a:solidFill>
+                <a:latin typeface="+mn-lt"/>
+                <a:ea typeface="+mn-ea"/>
+                <a:cs typeface="+mn-cs"/>
+              </a:defRPr>
+            </a:lvl9pPr>
+          </a:lstStyle>
+          <a:p>
+            <a:r>
+              <a:rPr lang="de-DE" dirty="0"/>
+              <a:t>32 Sekunden bei 900 </a:t>
+            </a:r>
+            <a:r>
+              <a:rPr lang="de-DE" dirty="0" err="1"/>
+              <a:t>vus</a:t>
+            </a:r>
+            <a:r>
+              <a:rPr lang="de-DE" dirty="0"/>
+              <a:t>.</a:t>
+            </a:r>
+          </a:p>
+          <a:p>
+            <a:r>
+              <a:rPr lang="de-DE" b="0" dirty="0">
+                <a:effectLst/>
+                <a:latin typeface="+mj-lt"/>
+              </a:rPr>
+              <a:t>858 Requests in 50 Sek. </a:t>
+            </a:r>
+            <a:br>
+              <a:rPr lang="de-DE" b="0" dirty="0">
+                <a:effectLst/>
+                <a:latin typeface="+mj-lt"/>
+              </a:rPr>
+            </a:br>
+            <a:r>
+              <a:rPr lang="de-DE" b="0" dirty="0">
+                <a:effectLst/>
+                <a:latin typeface="+mj-lt"/>
+              </a:rPr>
+              <a:t>= </a:t>
+            </a:r>
+            <a:r>
+              <a:rPr lang="de-DE" b="1" dirty="0">
+                <a:effectLst/>
+                <a:latin typeface="+mj-lt"/>
+              </a:rPr>
+              <a:t>17 Requests/Sekunde</a:t>
+            </a:r>
+          </a:p>
+          <a:p>
+            <a:endParaRPr lang="de-DE" dirty="0"/>
+          </a:p>
+        </p:txBody>
+      </p:sp>
+      <p:pic>
+        <p:nvPicPr>
+          <p:cNvPr id="6" name="Grafik 5" descr="Ein Bild, das Diagramm, Text, Reihe, parallel enthält.&#10;&#10;Automatisch generierte Beschreibung">
+            <a:extLst>
+              <a:ext uri="{FF2B5EF4-FFF2-40B4-BE49-F238E27FC236}">
+                <a16:creationId xmlns:a16="http://schemas.microsoft.com/office/drawing/2014/main" id="{4D98595F-1B26-17DB-6476-5B213618EDBA}"/>
+              </a:ext>
+            </a:extLst>
+          </p:cNvPr>
+          <p:cNvPicPr>
+            <a:picLocks noChangeAspect="1"/>
+          </p:cNvPicPr>
+          <p:nvPr/>
+        </p:nvPicPr>
+        <p:blipFill>
+          <a:blip r:embed="rId2">
+            <a:extLst>
+              <a:ext uri="{28A0092B-C50C-407E-A947-70E740481C1C}">
+                <a14:useLocalDpi xmlns:a14="http://schemas.microsoft.com/office/drawing/2010/main" val="0"/>
+              </a:ext>
+            </a:extLst>
+          </a:blip>
+          <a:stretch>
+            <a:fillRect/>
+          </a:stretch>
+        </p:blipFill>
+        <p:spPr>
+          <a:xfrm>
+            <a:off x="107950" y="1548547"/>
+            <a:ext cx="7070083" cy="4610714"/>
+          </a:xfrm>
+          <a:prstGeom prst="rect">
+            <a:avLst/>
+          </a:prstGeom>
+        </p:spPr>
+      </p:pic>
+    </p:spTree>
+    <p:extLst>
+      <p:ext uri="{BB962C8B-B14F-4D97-AF65-F5344CB8AC3E}">
+        <p14:creationId xmlns:p14="http://schemas.microsoft.com/office/powerpoint/2010/main" val="2929880915"/>
+      </p:ext>
+    </p:extLst>
+  </p:cSld>
+  <p:clrMapOvr>
+    <a:masterClrMapping/>
+  </p:clrMapOvr>
+  <mc:AlternateContent xmlns:mc="http://schemas.openxmlformats.org/markup-compatibility/2006" xmlns:p14="http://schemas.microsoft.com/office/powerpoint/2010/main">
+    <mc:Choice Requires="p14">
+      <p:transition spd="med" p14:dur="700">
+        <p:fade/>
+      </p:transition>
+    </mc:Choice>
+    <mc:Fallback xmlns="">
+      <p:transition spd="med">
+        <p:fade/>
+      </p:transition>
+    </mc:Fallback>
+  </mc:AlternateContent>
+</p:sld>
+</file>
+
+<file path=ppt/slides/slide24.xml><?xml version="1.0" encoding="utf-8"?>
+<p:sld xmlns:a="http://schemas.openxmlformats.org/drawingml/2006/main" xmlns:r="http://schemas.openxmlformats.org/officeDocument/2006/relationships" xmlns:p="http://schemas.openxmlformats.org/presentationml/2006/main">
+  <p:cSld>
+    <p:spTree>
+      <p:nvGrpSpPr>
+        <p:cNvPr id="1" name=""/>
+        <p:cNvGrpSpPr/>
+        <p:nvPr/>
+      </p:nvGrpSpPr>
+      <p:grpSpPr>
+        <a:xfrm>
+          <a:off x="0" y="0"/>
+          <a:ext cx="0" cy="0"/>
+          <a:chOff x="0" y="0"/>
+          <a:chExt cx="0" cy="0"/>
+        </a:xfrm>
+      </p:grpSpPr>
+      <p:sp>
+        <p:nvSpPr>
+          <p:cNvPr id="2" name="Titel 1">
+            <a:extLst>
+              <a:ext uri="{FF2B5EF4-FFF2-40B4-BE49-F238E27FC236}">
+                <a16:creationId xmlns:a16="http://schemas.microsoft.com/office/drawing/2014/main" id="{B22D74DF-2D49-1A74-620A-523203A43A2F}"/>
+              </a:ext>
+            </a:extLst>
+          </p:cNvPr>
+          <p:cNvSpPr>
+            <a:spLocks noGrp="1"/>
+          </p:cNvSpPr>
+          <p:nvPr>
+            <p:ph type="title"/>
+          </p:nvPr>
+        </p:nvSpPr>
+        <p:spPr/>
+        <p:txBody>
+          <a:bodyPr/>
+          <a:lstStyle/>
+          <a:p>
+            <a:r>
+              <a:rPr lang="de-DE" dirty="0"/>
+              <a:t>Neue Ergebnisse</a:t>
+            </a:r>
+          </a:p>
+        </p:txBody>
+      </p:sp>
+      <p:sp>
+        <p:nvSpPr>
+          <p:cNvPr id="8" name="Textplatzhalter 3">
+            <a:extLst>
+              <a:ext uri="{FF2B5EF4-FFF2-40B4-BE49-F238E27FC236}">
+                <a16:creationId xmlns:a16="http://schemas.microsoft.com/office/drawing/2014/main" id="{7308C11C-ACE4-C96A-BC26-915DF956C5C8}"/>
+              </a:ext>
+            </a:extLst>
+          </p:cNvPr>
+          <p:cNvSpPr>
+            <a:spLocks noGrp="1"/>
+          </p:cNvSpPr>
+          <p:nvPr/>
+        </p:nvSpPr>
+        <p:spPr bwMode="auto">
+          <a:xfrm>
+            <a:off x="374723" y="849131"/>
+            <a:ext cx="8820993" cy="504540"/>
+          </a:xfrm>
+          <a:prstGeom prst="rect">
+            <a:avLst/>
+          </a:prstGeom>
+          <a:noFill/>
+          <a:ln>
+            <a:noFill/>
+          </a:ln>
+          <a:extLst>
+            <a:ext uri="{909E8E84-426E-40DD-AFC4-6F175D3DCCD1}">
+              <a14:hiddenFill xmlns:a14="http://schemas.microsoft.com/office/drawing/2010/main">
+                <a:solidFill>
+                  <a:srgbClr val="FFFFFF"/>
+                </a:solidFill>
+              </a14:hiddenFill>
+            </a:ext>
+            <a:ext uri="{91240B29-F687-4F45-9708-019B960494DF}">
+              <a14:hiddenLine xmlns:a14="http://schemas.microsoft.com/office/drawing/2010/main" w="9525">
+                <a:solidFill>
+                  <a:srgbClr val="000000"/>
+                </a:solidFill>
+                <a:miter lim="800000"/>
+                <a:headEnd/>
+                <a:tailEnd/>
+              </a14:hiddenLine>
+            </a:ext>
+          </a:extLst>
+        </p:spPr>
+        <p:txBody>
+          <a:bodyPr vert="horz" wrap="square" lIns="0" tIns="0" rIns="0" bIns="0" numCol="1" anchor="t" anchorCtr="0" compatLnSpc="1">
+            <a:prstTxWarp prst="textNoShape">
+              <a:avLst/>
+            </a:prstTxWarp>
+          </a:bodyPr>
+          <a:lstStyle>
+            <a:lvl1pPr marL="0" indent="0" algn="l" rtl="0" fontAlgn="base">
+              <a:lnSpc>
+                <a:spcPct val="110000"/>
+              </a:lnSpc>
+              <a:spcBef>
+                <a:spcPct val="0"/>
+              </a:spcBef>
+              <a:spcAft>
+                <a:spcPct val="0"/>
+              </a:spcAft>
+              <a:buFont typeface="Arial" panose="020B0604020202020204" pitchFamily="34" charset="0"/>
+              <a:buNone/>
+              <a:defRPr sz="2800" kern="1200">
+                <a:solidFill>
+                  <a:schemeClr val="tx2"/>
+                </a:solidFill>
+                <a:latin typeface="+mn-lt"/>
+                <a:ea typeface="+mn-ea"/>
+                <a:cs typeface="+mn-cs"/>
+              </a:defRPr>
+            </a:lvl1pPr>
+            <a:lvl2pPr marL="984250" indent="-355600" algn="l" rtl="0" fontAlgn="base">
+              <a:lnSpc>
+                <a:spcPct val="110000"/>
+              </a:lnSpc>
+              <a:spcBef>
+                <a:spcPct val="0"/>
+              </a:spcBef>
+              <a:spcAft>
+                <a:spcPct val="0"/>
+              </a:spcAft>
+              <a:buFont typeface="Arial" panose="020B0604020202020204" pitchFamily="34" charset="0"/>
+              <a:buChar char="–"/>
+              <a:defRPr sz="1900" kern="1200">
+                <a:solidFill>
+                  <a:schemeClr val="tx1"/>
+                </a:solidFill>
+                <a:latin typeface="+mn-lt"/>
+                <a:ea typeface="+mn-ea"/>
+                <a:cs typeface="+mn-cs"/>
+              </a:defRPr>
+            </a:lvl2pPr>
+            <a:lvl3pPr marL="1346200" indent="-361950" algn="l" rtl="0" fontAlgn="base">
+              <a:lnSpc>
+                <a:spcPct val="110000"/>
+              </a:lnSpc>
+              <a:spcBef>
+                <a:spcPct val="0"/>
+              </a:spcBef>
+              <a:spcAft>
+                <a:spcPct val="0"/>
+              </a:spcAft>
+              <a:buFont typeface="Arial" panose="020B0604020202020204" pitchFamily="34" charset="0"/>
+              <a:buChar char="–"/>
+              <a:defRPr sz="1900" kern="1200">
+                <a:solidFill>
+                  <a:schemeClr val="tx1"/>
+                </a:solidFill>
+                <a:latin typeface="+mn-lt"/>
+                <a:ea typeface="+mn-ea"/>
+                <a:cs typeface="+mn-cs"/>
+              </a:defRPr>
+            </a:lvl3pPr>
+            <a:lvl4pPr marL="1701800" indent="-355600" algn="l" rtl="0" fontAlgn="base">
+              <a:lnSpc>
+                <a:spcPct val="110000"/>
+              </a:lnSpc>
+              <a:spcBef>
+                <a:spcPct val="0"/>
+              </a:spcBef>
+              <a:spcAft>
+                <a:spcPct val="0"/>
+              </a:spcAft>
+              <a:buFont typeface="Arial" panose="020B0604020202020204" pitchFamily="34" charset="0"/>
+              <a:buChar char="–"/>
+              <a:defRPr sz="1900" kern="1200">
+                <a:solidFill>
+                  <a:schemeClr val="tx1"/>
+                </a:solidFill>
+                <a:latin typeface="+mn-lt"/>
+                <a:ea typeface="+mn-ea"/>
+                <a:cs typeface="+mn-cs"/>
+              </a:defRPr>
+            </a:lvl4pPr>
+            <a:lvl5pPr marL="2063750" indent="-361950" algn="l" rtl="0" fontAlgn="base">
+              <a:lnSpc>
+                <a:spcPct val="110000"/>
+              </a:lnSpc>
+              <a:spcBef>
+                <a:spcPct val="0"/>
+              </a:spcBef>
+              <a:spcAft>
+                <a:spcPct val="0"/>
+              </a:spcAft>
+              <a:buFont typeface="Arial" panose="020B0604020202020204" pitchFamily="34" charset="0"/>
+              <a:buChar char="–"/>
+              <a:defRPr sz="1900" kern="1200">
+                <a:solidFill>
+                  <a:schemeClr val="tx1"/>
+                </a:solidFill>
+                <a:latin typeface="+mn-lt"/>
+                <a:ea typeface="+mn-ea"/>
+                <a:cs typeface="+mn-cs"/>
+              </a:defRPr>
+            </a:lvl5pPr>
+            <a:lvl6pPr marL="2514600" indent="-228600" algn="l" defTabSz="914400" rtl="0" eaLnBrk="1" latinLnBrk="0" hangingPunct="1">
+              <a:lnSpc>
+                <a:spcPct val="90000"/>
+              </a:lnSpc>
+              <a:spcBef>
+                <a:spcPts val="500"/>
+              </a:spcBef>
+              <a:buFont typeface="Arial" panose="020B0604020202020204" pitchFamily="34" charset="0"/>
+              <a:buChar char="•"/>
+              <a:defRPr sz="1800" kern="1200">
+                <a:solidFill>
+                  <a:schemeClr val="tx1"/>
+                </a:solidFill>
+                <a:latin typeface="+mn-lt"/>
+                <a:ea typeface="+mn-ea"/>
+                <a:cs typeface="+mn-cs"/>
+              </a:defRPr>
+            </a:lvl6pPr>
+            <a:lvl7pPr marL="2971800" indent="-228600" algn="l" defTabSz="914400" rtl="0" eaLnBrk="1" latinLnBrk="0" hangingPunct="1">
+              <a:lnSpc>
+                <a:spcPct val="90000"/>
+              </a:lnSpc>
+              <a:spcBef>
+                <a:spcPts val="500"/>
+              </a:spcBef>
+              <a:buFont typeface="Arial" panose="020B0604020202020204" pitchFamily="34" charset="0"/>
+              <a:buChar char="•"/>
+              <a:defRPr sz="1800" kern="1200">
+                <a:solidFill>
+                  <a:schemeClr val="tx1"/>
+                </a:solidFill>
+                <a:latin typeface="+mn-lt"/>
+                <a:ea typeface="+mn-ea"/>
+                <a:cs typeface="+mn-cs"/>
+              </a:defRPr>
+            </a:lvl7pPr>
+            <a:lvl8pPr marL="3429000" indent="-228600" algn="l" defTabSz="914400" rtl="0" eaLnBrk="1" latinLnBrk="0" hangingPunct="1">
+              <a:lnSpc>
+                <a:spcPct val="90000"/>
+              </a:lnSpc>
+              <a:spcBef>
+                <a:spcPts val="500"/>
+              </a:spcBef>
+              <a:buFont typeface="Arial" panose="020B0604020202020204" pitchFamily="34" charset="0"/>
+              <a:buChar char="•"/>
+              <a:defRPr sz="1800" kern="1200">
+                <a:solidFill>
+                  <a:schemeClr val="tx1"/>
+                </a:solidFill>
+                <a:latin typeface="+mn-lt"/>
+                <a:ea typeface="+mn-ea"/>
+                <a:cs typeface="+mn-cs"/>
+              </a:defRPr>
+            </a:lvl8pPr>
+            <a:lvl9pPr marL="3886200" indent="-228600" algn="l" defTabSz="914400" rtl="0" eaLnBrk="1" latinLnBrk="0" hangingPunct="1">
+              <a:lnSpc>
+                <a:spcPct val="90000"/>
+              </a:lnSpc>
+              <a:spcBef>
+                <a:spcPts val="500"/>
+              </a:spcBef>
+              <a:buFont typeface="Arial" panose="020B0604020202020204" pitchFamily="34" charset="0"/>
+              <a:buChar char="•"/>
+              <a:defRPr sz="1800" kern="1200">
+                <a:solidFill>
+                  <a:schemeClr val="tx1"/>
+                </a:solidFill>
+                <a:latin typeface="+mn-lt"/>
+                <a:ea typeface="+mn-ea"/>
+                <a:cs typeface="+mn-cs"/>
+              </a:defRPr>
+            </a:lvl9pPr>
+          </a:lstStyle>
+          <a:p>
+            <a:r>
+              <a:rPr lang="de-DE" dirty="0">
+                <a:cs typeface="Arial"/>
+              </a:rPr>
+              <a:t>Interpretation</a:t>
+            </a:r>
+            <a:endParaRPr lang="de-DE" dirty="0"/>
+          </a:p>
+        </p:txBody>
+      </p:sp>
+      <p:sp>
+        <p:nvSpPr>
+          <p:cNvPr id="5" name="Inhaltsplatzhalter 2">
+            <a:extLst>
+              <a:ext uri="{FF2B5EF4-FFF2-40B4-BE49-F238E27FC236}">
+                <a16:creationId xmlns:a16="http://schemas.microsoft.com/office/drawing/2014/main" id="{10983D68-22A8-E9A5-C4F6-235367235DFF}"/>
+              </a:ext>
+            </a:extLst>
+          </p:cNvPr>
+          <p:cNvSpPr txBox="1">
+            <a:spLocks/>
+          </p:cNvSpPr>
+          <p:nvPr/>
+        </p:nvSpPr>
+        <p:spPr>
+          <a:xfrm>
+            <a:off x="371475" y="1548547"/>
+            <a:ext cx="10371903" cy="4200582"/>
+          </a:xfrm>
+          <a:prstGeom prst="rect">
+            <a:avLst/>
+          </a:prstGeom>
+        </p:spPr>
+        <p:txBody>
+          <a:bodyPr vert="horz" lIns="0" tIns="0" rIns="0" bIns="0" rtlCol="0" anchor="t" anchorCtr="0">
+            <a:noAutofit/>
+          </a:bodyPr>
+          <a:lstStyle>
+            <a:lvl1pPr marL="355600" indent="-355600" algn="l" defTabSz="914400" rtl="0" eaLnBrk="1" latinLnBrk="0" hangingPunct="1">
+              <a:lnSpc>
+                <a:spcPct val="110000"/>
+              </a:lnSpc>
+              <a:spcBef>
+                <a:spcPts val="0"/>
+              </a:spcBef>
+              <a:buClr>
+                <a:srgbClr val="0014A0"/>
+              </a:buClr>
+              <a:buFont typeface="Arial" panose="020B0604020202020204" pitchFamily="34" charset="0"/>
+              <a:buChar char="•"/>
+              <a:defRPr sz="1900" kern="1200">
+                <a:solidFill>
+                  <a:schemeClr val="tx1"/>
+                </a:solidFill>
+                <a:latin typeface="+mn-lt"/>
+                <a:ea typeface="+mn-ea"/>
+                <a:cs typeface="+mn-cs"/>
+              </a:defRPr>
+            </a:lvl1pPr>
+            <a:lvl2pPr marL="984250" indent="-355600" algn="l" defTabSz="914400" rtl="0" eaLnBrk="1" latinLnBrk="0" hangingPunct="1">
+              <a:lnSpc>
+                <a:spcPct val="110000"/>
+              </a:lnSpc>
+              <a:spcBef>
+                <a:spcPts val="0"/>
+              </a:spcBef>
+              <a:buFont typeface="Arial" panose="020B0604020202020204" pitchFamily="34" charset="0"/>
+              <a:buChar char="–"/>
+              <a:defRPr sz="1900" kern="1200">
+                <a:solidFill>
+                  <a:schemeClr val="tx1"/>
+                </a:solidFill>
+                <a:latin typeface="+mn-lt"/>
+                <a:ea typeface="+mn-ea"/>
+                <a:cs typeface="+mn-cs"/>
+              </a:defRPr>
+            </a:lvl2pPr>
+            <a:lvl3pPr marL="1346200" indent="-361950" algn="l" defTabSz="914400" rtl="0" eaLnBrk="1" latinLnBrk="0" hangingPunct="1">
+              <a:lnSpc>
+                <a:spcPct val="110000"/>
+              </a:lnSpc>
+              <a:spcBef>
+                <a:spcPts val="0"/>
+              </a:spcBef>
+              <a:buFont typeface="Arial" panose="020B0604020202020204" pitchFamily="34" charset="0"/>
+              <a:buChar char="–"/>
+              <a:defRPr sz="1900" kern="1200">
+                <a:solidFill>
+                  <a:schemeClr val="tx1"/>
+                </a:solidFill>
+                <a:latin typeface="+mn-lt"/>
+                <a:ea typeface="+mn-ea"/>
+                <a:cs typeface="+mn-cs"/>
+              </a:defRPr>
+            </a:lvl3pPr>
+            <a:lvl4pPr marL="1701800" indent="-355600" algn="l" defTabSz="914400" rtl="0" eaLnBrk="1" latinLnBrk="0" hangingPunct="1">
+              <a:lnSpc>
+                <a:spcPct val="110000"/>
+              </a:lnSpc>
+              <a:spcBef>
+                <a:spcPts val="0"/>
+              </a:spcBef>
+              <a:buFont typeface="Arial" panose="020B0604020202020204" pitchFamily="34" charset="0"/>
+              <a:buChar char="–"/>
+              <a:defRPr sz="1900" kern="1200">
+                <a:solidFill>
+                  <a:schemeClr val="tx1"/>
+                </a:solidFill>
+                <a:latin typeface="+mn-lt"/>
+                <a:ea typeface="+mn-ea"/>
+                <a:cs typeface="+mn-cs"/>
+              </a:defRPr>
+            </a:lvl4pPr>
+            <a:lvl5pPr marL="2063750" indent="-361950" algn="l" defTabSz="914400" rtl="0" eaLnBrk="1" latinLnBrk="0" hangingPunct="1">
+              <a:lnSpc>
+                <a:spcPct val="110000"/>
+              </a:lnSpc>
+              <a:spcBef>
+                <a:spcPts val="0"/>
+              </a:spcBef>
+              <a:buFont typeface="Arial" panose="020B0604020202020204" pitchFamily="34" charset="0"/>
+              <a:buChar char="–"/>
+              <a:defRPr sz="1900" kern="1200">
+                <a:solidFill>
+                  <a:schemeClr val="tx1"/>
+                </a:solidFill>
+                <a:latin typeface="+mn-lt"/>
+                <a:ea typeface="+mn-ea"/>
+                <a:cs typeface="+mn-cs"/>
+              </a:defRPr>
+            </a:lvl5pPr>
+            <a:lvl6pPr marL="2514600" indent="-228600" algn="l" defTabSz="914400" rtl="0" eaLnBrk="1" latinLnBrk="0" hangingPunct="1">
+              <a:lnSpc>
+                <a:spcPct val="90000"/>
+              </a:lnSpc>
+              <a:spcBef>
+                <a:spcPts val="500"/>
+              </a:spcBef>
+              <a:buFont typeface="Arial" panose="020B0604020202020204" pitchFamily="34" charset="0"/>
+              <a:buChar char="•"/>
+              <a:defRPr sz="1800" kern="1200">
+                <a:solidFill>
+                  <a:schemeClr val="tx1"/>
+                </a:solidFill>
+                <a:latin typeface="+mn-lt"/>
+                <a:ea typeface="+mn-ea"/>
+                <a:cs typeface="+mn-cs"/>
+              </a:defRPr>
+            </a:lvl6pPr>
+            <a:lvl7pPr marL="2971800" indent="-228600" algn="l" defTabSz="914400" rtl="0" eaLnBrk="1" latinLnBrk="0" hangingPunct="1">
+              <a:lnSpc>
+                <a:spcPct val="90000"/>
+              </a:lnSpc>
+              <a:spcBef>
+                <a:spcPts val="500"/>
+              </a:spcBef>
+              <a:buFont typeface="Arial" panose="020B0604020202020204" pitchFamily="34" charset="0"/>
+              <a:buChar char="•"/>
+              <a:defRPr sz="1800" kern="1200">
+                <a:solidFill>
+                  <a:schemeClr val="tx1"/>
+                </a:solidFill>
+                <a:latin typeface="+mn-lt"/>
+                <a:ea typeface="+mn-ea"/>
+                <a:cs typeface="+mn-cs"/>
+              </a:defRPr>
+            </a:lvl7pPr>
+            <a:lvl8pPr marL="3429000" indent="-228600" algn="l" defTabSz="914400" rtl="0" eaLnBrk="1" latinLnBrk="0" hangingPunct="1">
+              <a:lnSpc>
+                <a:spcPct val="90000"/>
+              </a:lnSpc>
+              <a:spcBef>
+                <a:spcPts val="500"/>
+              </a:spcBef>
+              <a:buFont typeface="Arial" panose="020B0604020202020204" pitchFamily="34" charset="0"/>
+              <a:buChar char="•"/>
+              <a:defRPr sz="1800" kern="1200">
+                <a:solidFill>
+                  <a:schemeClr val="tx1"/>
+                </a:solidFill>
+                <a:latin typeface="+mn-lt"/>
+                <a:ea typeface="+mn-ea"/>
+                <a:cs typeface="+mn-cs"/>
+              </a:defRPr>
+            </a:lvl8pPr>
+            <a:lvl9pPr marL="3886200" indent="-228600" algn="l" defTabSz="914400" rtl="0" eaLnBrk="1" latinLnBrk="0" hangingPunct="1">
+              <a:lnSpc>
+                <a:spcPct val="90000"/>
+              </a:lnSpc>
+              <a:spcBef>
+                <a:spcPts val="500"/>
+              </a:spcBef>
+              <a:buFont typeface="Arial" panose="020B0604020202020204" pitchFamily="34" charset="0"/>
+              <a:buChar char="•"/>
+              <a:defRPr sz="1800" kern="1200">
+                <a:solidFill>
+                  <a:schemeClr val="tx1"/>
+                </a:solidFill>
+                <a:latin typeface="+mn-lt"/>
+                <a:ea typeface="+mn-ea"/>
+                <a:cs typeface="+mn-cs"/>
+              </a:defRPr>
+            </a:lvl9pPr>
+          </a:lstStyle>
+          <a:p>
+            <a:r>
+              <a:rPr lang="de-DE" dirty="0"/>
+              <a:t>Es gibt eine „Magische Grenze“ bei ca. </a:t>
+            </a:r>
+            <a:r>
+              <a:rPr lang="de-DE" b="1" dirty="0"/>
+              <a:t>16 Requests/Sekunden </a:t>
+            </a:r>
+            <a:r>
+              <a:rPr lang="de-DE" dirty="0"/>
+              <a:t>für den </a:t>
+            </a:r>
+            <a:r>
+              <a:rPr lang="de-DE" b="1" dirty="0"/>
+              <a:t>Maximalen Durchsatz.</a:t>
+            </a:r>
+          </a:p>
+          <a:p>
+            <a:r>
+              <a:rPr lang="de-DE" dirty="0"/>
+              <a:t>Die Erklärung ist denkbar einfach: Da der </a:t>
+            </a:r>
+            <a:r>
+              <a:rPr lang="de-DE" u="sng" dirty="0"/>
+              <a:t>Docker-Container 8 Cores </a:t>
+            </a:r>
+            <a:r>
+              <a:rPr lang="de-DE" dirty="0"/>
+              <a:t>bekommen hat und </a:t>
+            </a:r>
+            <a:r>
+              <a:rPr lang="de-DE" u="sng" dirty="0"/>
+              <a:t>jeder Requests ca. 0,5 Sek</a:t>
+            </a:r>
+            <a:r>
+              <a:rPr lang="de-DE" dirty="0"/>
+              <a:t>. CPU-Zeit benötigt schafft </a:t>
+            </a:r>
+            <a:r>
+              <a:rPr lang="de-DE" u="sng" dirty="0"/>
+              <a:t>1 Core 2 Request/Sekunde </a:t>
+            </a:r>
+            <a:r>
+              <a:rPr lang="de-DE" dirty="0"/>
+              <a:t>bzw. </a:t>
+            </a:r>
+            <a:r>
+              <a:rPr lang="de-DE" u="sng" dirty="0"/>
+              <a:t>8 Cores 16 Requests/Sekunde</a:t>
+            </a:r>
+          </a:p>
+          <a:p>
+            <a:r>
+              <a:rPr lang="de-DE" dirty="0"/>
+              <a:t>Ergebnis: Bei CPU-Lastigen Requests ist der Flaschenhals die CPU, egal ob Reaktiv, Virtual oder Normal.</a:t>
+            </a:r>
+          </a:p>
+          <a:p>
+            <a:r>
+              <a:rPr lang="de-DE" dirty="0">
+                <a:solidFill>
+                  <a:schemeClr val="accent1"/>
+                </a:solidFill>
+              </a:rPr>
+              <a:t>Obwohl nur 1/3 des Requests gerechnet wird, geht der Vorteil von Virtual Threads und Reaktiver Programmierung komplett verloren.</a:t>
+            </a:r>
+          </a:p>
+        </p:txBody>
+      </p:sp>
+    </p:spTree>
+    <p:extLst>
+      <p:ext uri="{BB962C8B-B14F-4D97-AF65-F5344CB8AC3E}">
+        <p14:creationId xmlns:p14="http://schemas.microsoft.com/office/powerpoint/2010/main" val="997918127"/>
       </p:ext>
     </p:extLst>
   </p:cSld>
@@ -26415,15 +29342,6 @@
 </file>
 
 <file path=customXml/item2.xml><?xml version="1.0" encoding="utf-8"?>
-<?mso-contentType ?>
-<FormTemplates xmlns="http://schemas.microsoft.com/sharepoint/v3/contenttype/forms">
-  <Display>DocumentLibraryForm</Display>
-  <Edit>DocumentLibraryForm</Edit>
-  <New>DocumentLibraryForm</New>
-</FormTemplates>
-</file>
-
-<file path=customXml/item3.xml><?xml version="1.0" encoding="utf-8"?>
 <p:properties xmlns:p="http://schemas.microsoft.com/office/2006/metadata/properties" xmlns:xsi="http://www.w3.org/2001/XMLSchema-instance" xmlns:pc="http://schemas.microsoft.com/office/infopath/2007/PartnerControls">
   <documentManagement>
     <TaxCatchAll xmlns="4b1e1a4f-2377-48af-bcc8-9af2baee2b08" xsi:nil="true"/>
@@ -26432,6 +29350,15 @@
     </lcf76f155ced4ddcb4097134ff3c332f>
   </documentManagement>
 </p:properties>
+</file>
+
+<file path=customXml/item3.xml><?xml version="1.0" encoding="utf-8"?>
+<?mso-contentType ?>
+<FormTemplates xmlns="http://schemas.microsoft.com/sharepoint/v3/contenttype/forms">
+  <Display>DocumentLibraryForm</Display>
+  <Edit>DocumentLibraryForm</Edit>
+  <New>DocumentLibraryForm</New>
+</FormTemplates>
 </file>
 
 <file path=customXml/itemProps1.xml><?xml version="1.0" encoding="utf-8"?>
@@ -26454,14 +29381,6 @@
 </file>
 
 <file path=customXml/itemProps2.xml><?xml version="1.0" encoding="utf-8"?>
-<ds:datastoreItem xmlns:ds="http://schemas.openxmlformats.org/officeDocument/2006/customXml" ds:itemID="{FF726691-6D1E-4E2F-AD19-E9CA8464D57D}">
-  <ds:schemaRefs>
-    <ds:schemaRef ds:uri="http://schemas.microsoft.com/sharepoint/v3/contenttype/forms"/>
-  </ds:schemaRefs>
-</ds:datastoreItem>
-</file>
-
-<file path=customXml/itemProps3.xml><?xml version="1.0" encoding="utf-8"?>
 <ds:datastoreItem xmlns:ds="http://schemas.openxmlformats.org/officeDocument/2006/customXml" ds:itemID="{E2A36512-C1E6-43EE-BD5D-DEC9E86C5B95}">
   <ds:schemaRefs>
     <ds:schemaRef ds:uri="http://schemas.microsoft.com/office/2006/metadata/properties"/>
@@ -26477,4 +29396,12 @@
     <ds:schemaRef ds:uri="c97131b6-b26a-4299-b9b1-d0cf4861edc3"/>
   </ds:schemaRefs>
 </ds:datastoreItem>
+</file>
+
+<file path=customXml/itemProps3.xml><?xml version="1.0" encoding="utf-8"?>
+<ds:datastoreItem xmlns:ds="http://schemas.openxmlformats.org/officeDocument/2006/customXml" ds:itemID="{FF726691-6D1E-4E2F-AD19-E9CA8464D57D}">
+  <ds:schemaRefs>
+    <ds:schemaRef ds:uri="http://schemas.microsoft.com/sharepoint/v3/contenttype/forms"/>
+  </ds:schemaRefs>
+</ds:datastoreItem>
 </file>
</xml_diff>